<commit_message>
add remaining lectures and outline for mid prep
</commit_message>
<xml_diff>
--- a/ppts/lec 2.pptx
+++ b/ppts/lec 2.pptx
@@ -19,14 +19,15 @@
     <p:sldId id="267" r:id="rId13"/>
     <p:sldId id="268" r:id="rId14"/>
     <p:sldId id="269" r:id="rId15"/>
-    <p:sldId id="272" r:id="rId16"/>
-    <p:sldId id="273" r:id="rId17"/>
-    <p:sldId id="270" r:id="rId18"/>
-    <p:sldId id="271" r:id="rId19"/>
-    <p:sldId id="275" r:id="rId20"/>
-    <p:sldId id="276" r:id="rId21"/>
-    <p:sldId id="277" r:id="rId22"/>
-    <p:sldId id="278" r:id="rId23"/>
+    <p:sldId id="279" r:id="rId16"/>
+    <p:sldId id="272" r:id="rId17"/>
+    <p:sldId id="273" r:id="rId18"/>
+    <p:sldId id="270" r:id="rId19"/>
+    <p:sldId id="271" r:id="rId20"/>
+    <p:sldId id="275" r:id="rId21"/>
+    <p:sldId id="276" r:id="rId22"/>
+    <p:sldId id="277" r:id="rId23"/>
+    <p:sldId id="278" r:id="rId24"/>
   </p:sldIdLst>
   <p:sldSz cx="9144000" cy="6858000" type="screen4x3"/>
   <p:notesSz cx="6858000" cy="9144000"/>
@@ -125,6 +126,22 @@
       </a:defRPr>
     </a:lvl9pPr>
   </p:defaultTextStyle>
+  <p:extLst>
+    <p:ext uri="{EFAFB233-063F-42B5-8137-9DF3F51BA10A}">
+      <p15:sldGuideLst xmlns:p15="http://schemas.microsoft.com/office/powerpoint/2012/main">
+        <p15:guide id="1" orient="horz" pos="2160">
+          <p15:clr>
+            <a:srgbClr val="A4A3A4"/>
+          </p15:clr>
+        </p15:guide>
+        <p15:guide id="2" pos="2880">
+          <p15:clr>
+            <a:srgbClr val="A4A3A4"/>
+          </p15:clr>
+        </p15:guide>
+      </p15:sldGuideLst>
+    </p:ext>
+  </p:extLst>
 </p:presentation>
 </file>
 
@@ -166,10 +183,9 @@
           <a:lstStyle/>
           <a:p>
             <a:r>
-              <a:rPr lang="en-US" smtClean="0"/>
+              <a:rPr lang="en-US"/>
               <a:t>Click to edit Master title style</a:t>
             </a:r>
-            <a:endParaRPr lang="en-US"/>
           </a:p>
         </p:txBody>
       </p:sp>
@@ -285,10 +301,9 @@
           </a:lstStyle>
           <a:p>
             <a:r>
-              <a:rPr lang="en-US" smtClean="0"/>
+              <a:rPr lang="en-US"/>
               <a:t>Click to edit Master subtitle style</a:t>
             </a:r>
-            <a:endParaRPr lang="en-US"/>
           </a:p>
         </p:txBody>
       </p:sp>
@@ -309,7 +324,7 @@
           <a:p>
             <a:fld id="{67E85111-63A4-4A58-A067-056B895197AF}" type="datetimeFigureOut">
               <a:rPr lang="en-US" smtClean="0"/>
-              <a:t>3/4/2022</a:t>
+              <a:t>8/31/2022</a:t>
             </a:fld>
             <a:endParaRPr lang="en-US"/>
           </a:p>
@@ -403,10 +418,9 @@
           <a:lstStyle/>
           <a:p>
             <a:r>
-              <a:rPr lang="en-US" smtClean="0"/>
+              <a:rPr lang="en-US"/>
               <a:t>Click to edit Master title style</a:t>
             </a:r>
-            <a:endParaRPr lang="en-US"/>
           </a:p>
         </p:txBody>
       </p:sp>
@@ -427,38 +441,37 @@
           <a:p>
             <a:pPr lvl="0"/>
             <a:r>
-              <a:rPr lang="en-US" smtClean="0"/>
+              <a:rPr lang="en-US"/>
               <a:t>Click to edit Master text styles</a:t>
             </a:r>
           </a:p>
           <a:p>
             <a:pPr lvl="1"/>
             <a:r>
-              <a:rPr lang="en-US" smtClean="0"/>
+              <a:rPr lang="en-US"/>
               <a:t>Second level</a:t>
             </a:r>
           </a:p>
           <a:p>
             <a:pPr lvl="2"/>
             <a:r>
-              <a:rPr lang="en-US" smtClean="0"/>
+              <a:rPr lang="en-US"/>
               <a:t>Third level</a:t>
             </a:r>
           </a:p>
           <a:p>
             <a:pPr lvl="3"/>
             <a:r>
-              <a:rPr lang="en-US" smtClean="0"/>
+              <a:rPr lang="en-US"/>
               <a:t>Fourth level</a:t>
             </a:r>
           </a:p>
           <a:p>
             <a:pPr lvl="4"/>
             <a:r>
-              <a:rPr lang="en-US" smtClean="0"/>
+              <a:rPr lang="en-US"/>
               <a:t>Fifth level</a:t>
             </a:r>
-            <a:endParaRPr lang="en-US"/>
           </a:p>
         </p:txBody>
       </p:sp>
@@ -479,7 +492,7 @@
           <a:p>
             <a:fld id="{67E85111-63A4-4A58-A067-056B895197AF}" type="datetimeFigureOut">
               <a:rPr lang="en-US" smtClean="0"/>
-              <a:t>3/4/2022</a:t>
+              <a:t>8/31/2022</a:t>
             </a:fld>
             <a:endParaRPr lang="en-US"/>
           </a:p>
@@ -578,10 +591,9 @@
           <a:lstStyle/>
           <a:p>
             <a:r>
-              <a:rPr lang="en-US" smtClean="0"/>
+              <a:rPr lang="en-US"/>
               <a:t>Click to edit Master title style</a:t>
             </a:r>
-            <a:endParaRPr lang="en-US"/>
           </a:p>
         </p:txBody>
       </p:sp>
@@ -607,38 +619,37 @@
           <a:p>
             <a:pPr lvl="0"/>
             <a:r>
-              <a:rPr lang="en-US" smtClean="0"/>
+              <a:rPr lang="en-US"/>
               <a:t>Click to edit Master text styles</a:t>
             </a:r>
           </a:p>
           <a:p>
             <a:pPr lvl="1"/>
             <a:r>
-              <a:rPr lang="en-US" smtClean="0"/>
+              <a:rPr lang="en-US"/>
               <a:t>Second level</a:t>
             </a:r>
           </a:p>
           <a:p>
             <a:pPr lvl="2"/>
             <a:r>
-              <a:rPr lang="en-US" smtClean="0"/>
+              <a:rPr lang="en-US"/>
               <a:t>Third level</a:t>
             </a:r>
           </a:p>
           <a:p>
             <a:pPr lvl="3"/>
             <a:r>
-              <a:rPr lang="en-US" smtClean="0"/>
+              <a:rPr lang="en-US"/>
               <a:t>Fourth level</a:t>
             </a:r>
           </a:p>
           <a:p>
             <a:pPr lvl="4"/>
             <a:r>
-              <a:rPr lang="en-US" smtClean="0"/>
+              <a:rPr lang="en-US"/>
               <a:t>Fifth level</a:t>
             </a:r>
-            <a:endParaRPr lang="en-US"/>
           </a:p>
         </p:txBody>
       </p:sp>
@@ -659,7 +670,7 @@
           <a:p>
             <a:fld id="{67E85111-63A4-4A58-A067-056B895197AF}" type="datetimeFigureOut">
               <a:rPr lang="en-US" smtClean="0"/>
-              <a:t>3/4/2022</a:t>
+              <a:t>8/31/2022</a:t>
             </a:fld>
             <a:endParaRPr lang="en-US"/>
           </a:p>
@@ -753,10 +764,9 @@
           <a:lstStyle/>
           <a:p>
             <a:r>
-              <a:rPr lang="en-US" smtClean="0"/>
+              <a:rPr lang="en-US"/>
               <a:t>Click to edit Master title style</a:t>
             </a:r>
-            <a:endParaRPr lang="en-US"/>
           </a:p>
         </p:txBody>
       </p:sp>
@@ -777,38 +787,37 @@
           <a:p>
             <a:pPr lvl="0"/>
             <a:r>
-              <a:rPr lang="en-US" smtClean="0"/>
+              <a:rPr lang="en-US"/>
               <a:t>Click to edit Master text styles</a:t>
             </a:r>
           </a:p>
           <a:p>
             <a:pPr lvl="1"/>
             <a:r>
-              <a:rPr lang="en-US" smtClean="0"/>
+              <a:rPr lang="en-US"/>
               <a:t>Second level</a:t>
             </a:r>
           </a:p>
           <a:p>
             <a:pPr lvl="2"/>
             <a:r>
-              <a:rPr lang="en-US" smtClean="0"/>
+              <a:rPr lang="en-US"/>
               <a:t>Third level</a:t>
             </a:r>
           </a:p>
           <a:p>
             <a:pPr lvl="3"/>
             <a:r>
-              <a:rPr lang="en-US" smtClean="0"/>
+              <a:rPr lang="en-US"/>
               <a:t>Fourth level</a:t>
             </a:r>
           </a:p>
           <a:p>
             <a:pPr lvl="4"/>
             <a:r>
-              <a:rPr lang="en-US" smtClean="0"/>
+              <a:rPr lang="en-US"/>
               <a:t>Fifth level</a:t>
             </a:r>
-            <a:endParaRPr lang="en-US"/>
           </a:p>
         </p:txBody>
       </p:sp>
@@ -829,7 +838,7 @@
           <a:p>
             <a:fld id="{67E85111-63A4-4A58-A067-056B895197AF}" type="datetimeFigureOut">
               <a:rPr lang="en-US" smtClean="0"/>
-              <a:t>3/4/2022</a:t>
+              <a:t>8/31/2022</a:t>
             </a:fld>
             <a:endParaRPr lang="en-US"/>
           </a:p>
@@ -932,10 +941,9 @@
           </a:lstStyle>
           <a:p>
             <a:r>
-              <a:rPr lang="en-US" smtClean="0"/>
+              <a:rPr lang="en-US"/>
               <a:t>Click to edit Master title style</a:t>
             </a:r>
-            <a:endParaRPr lang="en-US"/>
           </a:p>
         </p:txBody>
       </p:sp>
@@ -1052,7 +1060,7 @@
           <a:p>
             <a:pPr lvl="0"/>
             <a:r>
-              <a:rPr lang="en-US" smtClean="0"/>
+              <a:rPr lang="en-US"/>
               <a:t>Click to edit Master text styles</a:t>
             </a:r>
           </a:p>
@@ -1075,7 +1083,7 @@
           <a:p>
             <a:fld id="{67E85111-63A4-4A58-A067-056B895197AF}" type="datetimeFigureOut">
               <a:rPr lang="en-US" smtClean="0"/>
-              <a:t>3/4/2022</a:t>
+              <a:t>8/31/2022</a:t>
             </a:fld>
             <a:endParaRPr lang="en-US"/>
           </a:p>
@@ -1169,10 +1177,9 @@
           <a:lstStyle/>
           <a:p>
             <a:r>
-              <a:rPr lang="en-US" smtClean="0"/>
+              <a:rPr lang="en-US"/>
               <a:t>Click to edit Master title style</a:t>
             </a:r>
-            <a:endParaRPr lang="en-US"/>
           </a:p>
         </p:txBody>
       </p:sp>
@@ -1226,38 +1233,37 @@
           <a:p>
             <a:pPr lvl="0"/>
             <a:r>
-              <a:rPr lang="en-US" smtClean="0"/>
+              <a:rPr lang="en-US"/>
               <a:t>Click to edit Master text styles</a:t>
             </a:r>
           </a:p>
           <a:p>
             <a:pPr lvl="1"/>
             <a:r>
-              <a:rPr lang="en-US" smtClean="0"/>
+              <a:rPr lang="en-US"/>
               <a:t>Second level</a:t>
             </a:r>
           </a:p>
           <a:p>
             <a:pPr lvl="2"/>
             <a:r>
-              <a:rPr lang="en-US" smtClean="0"/>
+              <a:rPr lang="en-US"/>
               <a:t>Third level</a:t>
             </a:r>
           </a:p>
           <a:p>
             <a:pPr lvl="3"/>
             <a:r>
-              <a:rPr lang="en-US" smtClean="0"/>
+              <a:rPr lang="en-US"/>
               <a:t>Fourth level</a:t>
             </a:r>
           </a:p>
           <a:p>
             <a:pPr lvl="4"/>
             <a:r>
-              <a:rPr lang="en-US" smtClean="0"/>
+              <a:rPr lang="en-US"/>
               <a:t>Fifth level</a:t>
             </a:r>
-            <a:endParaRPr lang="en-US"/>
           </a:p>
         </p:txBody>
       </p:sp>
@@ -1311,38 +1317,37 @@
           <a:p>
             <a:pPr lvl="0"/>
             <a:r>
-              <a:rPr lang="en-US" smtClean="0"/>
+              <a:rPr lang="en-US"/>
               <a:t>Click to edit Master text styles</a:t>
             </a:r>
           </a:p>
           <a:p>
             <a:pPr lvl="1"/>
             <a:r>
-              <a:rPr lang="en-US" smtClean="0"/>
+              <a:rPr lang="en-US"/>
               <a:t>Second level</a:t>
             </a:r>
           </a:p>
           <a:p>
             <a:pPr lvl="2"/>
             <a:r>
-              <a:rPr lang="en-US" smtClean="0"/>
+              <a:rPr lang="en-US"/>
               <a:t>Third level</a:t>
             </a:r>
           </a:p>
           <a:p>
             <a:pPr lvl="3"/>
             <a:r>
-              <a:rPr lang="en-US" smtClean="0"/>
+              <a:rPr lang="en-US"/>
               <a:t>Fourth level</a:t>
             </a:r>
           </a:p>
           <a:p>
             <a:pPr lvl="4"/>
             <a:r>
-              <a:rPr lang="en-US" smtClean="0"/>
+              <a:rPr lang="en-US"/>
               <a:t>Fifth level</a:t>
             </a:r>
-            <a:endParaRPr lang="en-US"/>
           </a:p>
         </p:txBody>
       </p:sp>
@@ -1363,7 +1368,7 @@
           <a:p>
             <a:fld id="{67E85111-63A4-4A58-A067-056B895197AF}" type="datetimeFigureOut">
               <a:rPr lang="en-US" smtClean="0"/>
-              <a:t>3/4/2022</a:t>
+              <a:t>8/31/2022</a:t>
             </a:fld>
             <a:endParaRPr lang="en-US"/>
           </a:p>
@@ -1461,10 +1466,9 @@
           </a:lstStyle>
           <a:p>
             <a:r>
-              <a:rPr lang="en-US" smtClean="0"/>
+              <a:rPr lang="en-US"/>
               <a:t>Click to edit Master title style</a:t>
             </a:r>
-            <a:endParaRPr lang="en-US"/>
           </a:p>
         </p:txBody>
       </p:sp>
@@ -1527,7 +1531,7 @@
           <a:p>
             <a:pPr lvl="0"/>
             <a:r>
-              <a:rPr lang="en-US" smtClean="0"/>
+              <a:rPr lang="en-US"/>
               <a:t>Click to edit Master text styles</a:t>
             </a:r>
           </a:p>
@@ -1583,38 +1587,37 @@
           <a:p>
             <a:pPr lvl="0"/>
             <a:r>
-              <a:rPr lang="en-US" smtClean="0"/>
+              <a:rPr lang="en-US"/>
               <a:t>Click to edit Master text styles</a:t>
             </a:r>
           </a:p>
           <a:p>
             <a:pPr lvl="1"/>
             <a:r>
-              <a:rPr lang="en-US" smtClean="0"/>
+              <a:rPr lang="en-US"/>
               <a:t>Second level</a:t>
             </a:r>
           </a:p>
           <a:p>
             <a:pPr lvl="2"/>
             <a:r>
-              <a:rPr lang="en-US" smtClean="0"/>
+              <a:rPr lang="en-US"/>
               <a:t>Third level</a:t>
             </a:r>
           </a:p>
           <a:p>
             <a:pPr lvl="3"/>
             <a:r>
-              <a:rPr lang="en-US" smtClean="0"/>
+              <a:rPr lang="en-US"/>
               <a:t>Fourth level</a:t>
             </a:r>
           </a:p>
           <a:p>
             <a:pPr lvl="4"/>
             <a:r>
-              <a:rPr lang="en-US" smtClean="0"/>
+              <a:rPr lang="en-US"/>
               <a:t>Fifth level</a:t>
             </a:r>
-            <a:endParaRPr lang="en-US"/>
           </a:p>
         </p:txBody>
       </p:sp>
@@ -1677,7 +1680,7 @@
           <a:p>
             <a:pPr lvl="0"/>
             <a:r>
-              <a:rPr lang="en-US" smtClean="0"/>
+              <a:rPr lang="en-US"/>
               <a:t>Click to edit Master text styles</a:t>
             </a:r>
           </a:p>
@@ -1733,38 +1736,37 @@
           <a:p>
             <a:pPr lvl="0"/>
             <a:r>
-              <a:rPr lang="en-US" smtClean="0"/>
+              <a:rPr lang="en-US"/>
               <a:t>Click to edit Master text styles</a:t>
             </a:r>
           </a:p>
           <a:p>
             <a:pPr lvl="1"/>
             <a:r>
-              <a:rPr lang="en-US" smtClean="0"/>
+              <a:rPr lang="en-US"/>
               <a:t>Second level</a:t>
             </a:r>
           </a:p>
           <a:p>
             <a:pPr lvl="2"/>
             <a:r>
-              <a:rPr lang="en-US" smtClean="0"/>
+              <a:rPr lang="en-US"/>
               <a:t>Third level</a:t>
             </a:r>
           </a:p>
           <a:p>
             <a:pPr lvl="3"/>
             <a:r>
-              <a:rPr lang="en-US" smtClean="0"/>
+              <a:rPr lang="en-US"/>
               <a:t>Fourth level</a:t>
             </a:r>
           </a:p>
           <a:p>
             <a:pPr lvl="4"/>
             <a:r>
-              <a:rPr lang="en-US" smtClean="0"/>
+              <a:rPr lang="en-US"/>
               <a:t>Fifth level</a:t>
             </a:r>
-            <a:endParaRPr lang="en-US"/>
           </a:p>
         </p:txBody>
       </p:sp>
@@ -1785,7 +1787,7 @@
           <a:p>
             <a:fld id="{67E85111-63A4-4A58-A067-056B895197AF}" type="datetimeFigureOut">
               <a:rPr lang="en-US" smtClean="0"/>
-              <a:t>3/4/2022</a:t>
+              <a:t>8/31/2022</a:t>
             </a:fld>
             <a:endParaRPr lang="en-US"/>
           </a:p>
@@ -1879,10 +1881,9 @@
           <a:lstStyle/>
           <a:p>
             <a:r>
-              <a:rPr lang="en-US" smtClean="0"/>
+              <a:rPr lang="en-US"/>
               <a:t>Click to edit Master title style</a:t>
             </a:r>
-            <a:endParaRPr lang="en-US"/>
           </a:p>
         </p:txBody>
       </p:sp>
@@ -1903,7 +1904,7 @@
           <a:p>
             <a:fld id="{67E85111-63A4-4A58-A067-056B895197AF}" type="datetimeFigureOut">
               <a:rPr lang="en-US" smtClean="0"/>
-              <a:t>3/4/2022</a:t>
+              <a:t>8/31/2022</a:t>
             </a:fld>
             <a:endParaRPr lang="en-US"/>
           </a:p>
@@ -1998,7 +1999,7 @@
           <a:p>
             <a:fld id="{67E85111-63A4-4A58-A067-056B895197AF}" type="datetimeFigureOut">
               <a:rPr lang="en-US" smtClean="0"/>
-              <a:t>3/4/2022</a:t>
+              <a:t>8/31/2022</a:t>
             </a:fld>
             <a:endParaRPr lang="en-US"/>
           </a:p>
@@ -2101,10 +2102,9 @@
           </a:lstStyle>
           <a:p>
             <a:r>
-              <a:rPr lang="en-US" smtClean="0"/>
+              <a:rPr lang="en-US"/>
               <a:t>Click to edit Master title style</a:t>
             </a:r>
-            <a:endParaRPr lang="en-US"/>
           </a:p>
         </p:txBody>
       </p:sp>
@@ -2158,38 +2158,37 @@
           <a:p>
             <a:pPr lvl="0"/>
             <a:r>
-              <a:rPr lang="en-US" smtClean="0"/>
+              <a:rPr lang="en-US"/>
               <a:t>Click to edit Master text styles</a:t>
             </a:r>
           </a:p>
           <a:p>
             <a:pPr lvl="1"/>
             <a:r>
-              <a:rPr lang="en-US" smtClean="0"/>
+              <a:rPr lang="en-US"/>
               <a:t>Second level</a:t>
             </a:r>
           </a:p>
           <a:p>
             <a:pPr lvl="2"/>
             <a:r>
-              <a:rPr lang="en-US" smtClean="0"/>
+              <a:rPr lang="en-US"/>
               <a:t>Third level</a:t>
             </a:r>
           </a:p>
           <a:p>
             <a:pPr lvl="3"/>
             <a:r>
-              <a:rPr lang="en-US" smtClean="0"/>
+              <a:rPr lang="en-US"/>
               <a:t>Fourth level</a:t>
             </a:r>
           </a:p>
           <a:p>
             <a:pPr lvl="4"/>
             <a:r>
-              <a:rPr lang="en-US" smtClean="0"/>
+              <a:rPr lang="en-US"/>
               <a:t>Fifth level</a:t>
             </a:r>
-            <a:endParaRPr lang="en-US"/>
           </a:p>
         </p:txBody>
       </p:sp>
@@ -2252,7 +2251,7 @@
           <a:p>
             <a:pPr lvl="0"/>
             <a:r>
-              <a:rPr lang="en-US" smtClean="0"/>
+              <a:rPr lang="en-US"/>
               <a:t>Click to edit Master text styles</a:t>
             </a:r>
           </a:p>
@@ -2275,7 +2274,7 @@
           <a:p>
             <a:fld id="{67E85111-63A4-4A58-A067-056B895197AF}" type="datetimeFigureOut">
               <a:rPr lang="en-US" smtClean="0"/>
-              <a:t>3/4/2022</a:t>
+              <a:t>8/31/2022</a:t>
             </a:fld>
             <a:endParaRPr lang="en-US"/>
           </a:p>
@@ -2378,10 +2377,9 @@
           </a:lstStyle>
           <a:p>
             <a:r>
-              <a:rPr lang="en-US" smtClean="0"/>
+              <a:rPr lang="en-US"/>
               <a:t>Click to edit Master title style</a:t>
             </a:r>
-            <a:endParaRPr lang="en-US"/>
           </a:p>
         </p:txBody>
       </p:sp>
@@ -2505,7 +2503,7 @@
           <a:p>
             <a:pPr lvl="0"/>
             <a:r>
-              <a:rPr lang="en-US" smtClean="0"/>
+              <a:rPr lang="en-US"/>
               <a:t>Click to edit Master text styles</a:t>
             </a:r>
           </a:p>
@@ -2528,7 +2526,7 @@
           <a:p>
             <a:fld id="{67E85111-63A4-4A58-A067-056B895197AF}" type="datetimeFigureOut">
               <a:rPr lang="en-US" smtClean="0"/>
-              <a:t>3/4/2022</a:t>
+              <a:t>8/31/2022</a:t>
             </a:fld>
             <a:endParaRPr lang="en-US"/>
           </a:p>
@@ -2637,10 +2635,9 @@
           <a:lstStyle/>
           <a:p>
             <a:r>
-              <a:rPr lang="en-US" smtClean="0"/>
+              <a:rPr lang="en-US"/>
               <a:t>Click to edit Master title style</a:t>
             </a:r>
-            <a:endParaRPr lang="en-US"/>
           </a:p>
         </p:txBody>
       </p:sp>
@@ -2671,38 +2668,37 @@
           <a:p>
             <a:pPr lvl="0"/>
             <a:r>
-              <a:rPr lang="en-US" smtClean="0"/>
+              <a:rPr lang="en-US"/>
               <a:t>Click to edit Master text styles</a:t>
             </a:r>
           </a:p>
           <a:p>
             <a:pPr lvl="1"/>
             <a:r>
-              <a:rPr lang="en-US" smtClean="0"/>
+              <a:rPr lang="en-US"/>
               <a:t>Second level</a:t>
             </a:r>
           </a:p>
           <a:p>
             <a:pPr lvl="2"/>
             <a:r>
-              <a:rPr lang="en-US" smtClean="0"/>
+              <a:rPr lang="en-US"/>
               <a:t>Third level</a:t>
             </a:r>
           </a:p>
           <a:p>
             <a:pPr lvl="3"/>
             <a:r>
-              <a:rPr lang="en-US" smtClean="0"/>
+              <a:rPr lang="en-US"/>
               <a:t>Fourth level</a:t>
             </a:r>
           </a:p>
           <a:p>
             <a:pPr lvl="4"/>
             <a:r>
-              <a:rPr lang="en-US" smtClean="0"/>
+              <a:rPr lang="en-US"/>
               <a:t>Fifth level</a:t>
             </a:r>
-            <a:endParaRPr lang="en-US"/>
           </a:p>
         </p:txBody>
       </p:sp>
@@ -2741,7 +2737,7 @@
           <a:p>
             <a:fld id="{67E85111-63A4-4A58-A067-056B895197AF}" type="datetimeFigureOut">
               <a:rPr lang="en-US" smtClean="0"/>
-              <a:t>3/4/2022</a:t>
+              <a:t>8/31/2022</a:t>
             </a:fld>
             <a:endParaRPr lang="en-US"/>
           </a:p>
@@ -3132,14 +3128,13 @@
           <a:lstStyle/>
           <a:p>
             <a:r>
-              <a:rPr lang="en-US" dirty="0" err="1" smtClean="0"/>
+              <a:rPr lang="en-US" dirty="0" err="1"/>
               <a:t>Lec</a:t>
             </a:r>
             <a:r>
-              <a:rPr lang="en-US" dirty="0" smtClean="0"/>
+              <a:rPr lang="en-US" dirty="0"/>
               <a:t> 2</a:t>
             </a:r>
-            <a:endParaRPr lang="en-US" dirty="0"/>
           </a:p>
         </p:txBody>
       </p:sp>
@@ -3159,10 +3154,9 @@
           <a:lstStyle/>
           <a:p>
             <a:r>
-              <a:rPr lang="en-US" dirty="0" smtClean="0"/>
+              <a:rPr lang="en-US" dirty="0"/>
               <a:t>Cloud Computing</a:t>
             </a:r>
-            <a:endParaRPr lang="en-US" dirty="0"/>
           </a:p>
         </p:txBody>
       </p:sp>
@@ -3212,10 +3206,9 @@
           <a:lstStyle/>
           <a:p>
             <a:r>
-              <a:rPr lang="en-US" dirty="0" smtClean="0"/>
+              <a:rPr lang="en-US" dirty="0"/>
               <a:t>Advantages of cloud computing</a:t>
             </a:r>
-            <a:endParaRPr lang="en-US" dirty="0"/>
           </a:p>
         </p:txBody>
       </p:sp>
@@ -3319,11 +3312,7 @@
             </a:pPr>
             <a:r>
               <a:rPr lang="en-US" dirty="0"/>
-              <a:t>Most cloud computing services are provided self service and on demand, so even vast amounts of computing resources can be provisioned in minutes, typically with just a few mouse clicks, giving businesses a lot of flexibility and taking the pressure off capacity planning</a:t>
-            </a:r>
-            <a:r>
-              <a:rPr lang="en-US" dirty="0" smtClean="0"/>
-              <a:t>.</a:t>
+              <a:t>Most cloud computing services are provided self service and on demand, so even vast amounts of computing resources can be provisioned in minutes, typically with just a few mouse clicks, giving businesses a lot of flexibility and taking the pressure off capacity planning.</a:t>
             </a:r>
           </a:p>
           <a:p>
@@ -3341,15 +3330,7 @@
             </a:pPr>
             <a:r>
               <a:rPr lang="en-US" dirty="0"/>
-              <a:t>The benefits of cloud computing services include the ability to scale elastically. T</a:t>
-            </a:r>
-            <a:r>
-              <a:rPr lang="en-US" dirty="0" smtClean="0"/>
-              <a:t>hat </a:t>
-            </a:r>
-            <a:r>
-              <a:rPr lang="en-US" dirty="0"/>
-              <a:t>means delivering the right amount of IT resources—for example, more or less computing power, storage, bandwidth—right when they’re needed, and from the right geographic location.</a:t>
+              <a:t>The benefits of cloud computing services include the ability to scale elastically. That means delivering the right amount of IT resources—for example, more or less computing power, storage, bandwidth—right when they’re needed, and from the right geographic location.</a:t>
             </a:r>
           </a:p>
         </p:txBody>
@@ -3420,11 +3401,19 @@
             </a:pPr>
             <a:r>
               <a:rPr lang="en-US" dirty="0"/>
-              <a:t>On-site datacenters typically require a lot of “racking and stacking”—hardware setup, software patching, and other time-consuming IT management chores. Cloud computing removes the need for many of these tasks, so IT teams can spend time on achieving more important business goals</a:t>
-            </a:r>
-            <a:r>
-              <a:rPr lang="en-US" dirty="0" smtClean="0"/>
-              <a:t>.</a:t>
+              <a:t>On-site datacenters typically require a lot of “</a:t>
+            </a:r>
+            <a:r>
+              <a:rPr lang="en-US" dirty="0">
+                <a:solidFill>
+                  <a:srgbClr val="FF0000"/>
+                </a:solidFill>
+              </a:rPr>
+              <a:t>racking and stacking</a:t>
+            </a:r>
+            <a:r>
+              <a:rPr lang="en-US" dirty="0"/>
+              <a:t>”—hardware setup, software patching, and other time-consuming IT management chores. Cloud computing removes the need for many of these tasks, so IT teams can spend time on achieving more important business goals.</a:t>
             </a:r>
           </a:p>
           <a:p>
@@ -3558,10 +3547,9 @@
           <a:lstStyle/>
           <a:p>
             <a:r>
-              <a:rPr lang="en-US" dirty="0" smtClean="0"/>
+              <a:rPr lang="en-US" dirty="0"/>
               <a:t>disadvantages of cloud computing</a:t>
             </a:r>
-            <a:endParaRPr lang="en-US" dirty="0"/>
           </a:p>
         </p:txBody>
       </p:sp>
@@ -3589,31 +3577,19 @@
           <a:p>
             <a:r>
               <a:rPr lang="en-US" dirty="0"/>
-              <a:t>Cloud computing is not necessarily cheaper than other forms of computing, just as renting is not always cheaper than buying in the long </a:t>
-            </a:r>
-            <a:r>
-              <a:rPr lang="en-US" dirty="0" smtClean="0"/>
-              <a:t>term</a:t>
-            </a:r>
-          </a:p>
-          <a:p>
-            <a:r>
-              <a:rPr lang="en-US" dirty="0"/>
-              <a:t>If an application has a regular and predictable requirement for computing services it may be more economical to provide that service </a:t>
-            </a:r>
-            <a:r>
-              <a:rPr lang="en-US" dirty="0" smtClean="0"/>
-              <a:t>in-house</a:t>
-            </a:r>
-          </a:p>
-          <a:p>
-            <a:r>
-              <a:rPr lang="en-US" dirty="0"/>
-              <a:t>Some companies may be reluctant to host sensitive data in a service that is also used by </a:t>
-            </a:r>
-            <a:r>
-              <a:rPr lang="en-US" dirty="0" smtClean="0"/>
-              <a:t>rivals</a:t>
+              <a:t>Cloud computing is not necessarily cheaper than other forms of computing, just as renting is not always cheaper than buying in the long term</a:t>
+            </a:r>
+          </a:p>
+          <a:p>
+            <a:r>
+              <a:rPr lang="en-US" dirty="0"/>
+              <a:t>If an application has a regular and predictable requirement for computing services it may be more economical to provide that service in-house</a:t>
+            </a:r>
+          </a:p>
+          <a:p>
+            <a:r>
+              <a:rPr lang="en-US" dirty="0"/>
+              <a:t>Some companies may be reluctant to host sensitive data in a service that is also used by rivals</a:t>
             </a:r>
           </a:p>
           <a:p>
@@ -3656,81 +3632,67 @@
       </p:grpSpPr>
       <p:sp>
         <p:nvSpPr>
-          <p:cNvPr id="2" name="Title 1"/>
-          <p:cNvSpPr>
-            <a:spLocks noGrp="1"/>
-          </p:cNvSpPr>
-          <p:nvPr>
-            <p:ph type="title"/>
-          </p:nvPr>
-        </p:nvSpPr>
-        <p:spPr/>
-        <p:txBody>
-          <a:bodyPr/>
-          <a:lstStyle/>
-          <a:p>
-            <a:r>
-              <a:rPr lang="en-US" dirty="0" smtClean="0"/>
-              <a:t>Geography and Cloud Computing</a:t>
+          <p:cNvPr id="3" name="Content Placeholder 2">
+            <a:extLst>
+              <a:ext uri="{FF2B5EF4-FFF2-40B4-BE49-F238E27FC236}">
+                <a16:creationId xmlns:a16="http://schemas.microsoft.com/office/drawing/2014/main" id="{B8BEE0FF-0277-6356-EBA2-3CCC4FB89834}"/>
+              </a:ext>
+            </a:extLst>
+          </p:cNvPr>
+          <p:cNvSpPr>
+            <a:spLocks noGrp="1"/>
+          </p:cNvSpPr>
+          <p:nvPr>
+            <p:ph idx="1"/>
+          </p:nvPr>
+        </p:nvSpPr>
+        <p:spPr>
+          <a:xfrm>
+            <a:off x="533400" y="457200"/>
+            <a:ext cx="8229600" cy="4525963"/>
+          </a:xfrm>
+        </p:spPr>
+        <p:txBody>
+          <a:bodyPr>
+            <a:normAutofit fontScale="92500" lnSpcReduction="10000"/>
+          </a:bodyPr>
+          <a:lstStyle/>
+          <a:p>
+            <a:r>
+              <a:rPr lang="en-US" dirty="0"/>
+              <a:t>Even the largest and most technologically advanced companies can be vulnerable to being hacked.</a:t>
+            </a:r>
+          </a:p>
+          <a:p>
+            <a:r>
+              <a:rPr lang="en-US" dirty="0"/>
+              <a:t>Case in point is the pioneering electric car company, Tesla, owned by tech billionaire Elon Musk.</a:t>
+            </a:r>
+          </a:p>
+          <a:p>
+            <a:r>
+              <a:rPr lang="en-US" dirty="0"/>
+              <a:t>An unidentified hacker or hackers broke into a Tesla-owned Amazon cloud account and used it to “mine” cryptocurrency , </a:t>
+            </a:r>
+            <a:r>
+              <a:rPr lang="en-US" dirty="0" err="1"/>
+              <a:t>Monero</a:t>
             </a:r>
             <a:endParaRPr lang="en-US" dirty="0"/>
           </a:p>
-        </p:txBody>
-      </p:sp>
-      <p:sp>
-        <p:nvSpPr>
-          <p:cNvPr id="3" name="Content Placeholder 2"/>
-          <p:cNvSpPr>
-            <a:spLocks noGrp="1"/>
-          </p:cNvSpPr>
-          <p:nvPr>
-            <p:ph idx="1"/>
-          </p:nvPr>
-        </p:nvSpPr>
-        <p:spPr/>
-        <p:txBody>
-          <a:bodyPr/>
-          <a:lstStyle/>
-          <a:p>
-            <a:r>
-              <a:rPr lang="en-US" dirty="0"/>
-              <a:t>Geopolitics is forcing significant changes on cloud-computing users and </a:t>
-            </a:r>
-            <a:r>
-              <a:rPr lang="en-US" dirty="0" smtClean="0"/>
-              <a:t>vendors</a:t>
-            </a:r>
-          </a:p>
-          <a:p>
-            <a:r>
-              <a:rPr lang="en-US" dirty="0"/>
-              <a:t>Firstly, there is the issue of latency: if the application is coming from a data </a:t>
-            </a:r>
-            <a:r>
-              <a:rPr lang="en-US" dirty="0" smtClean="0"/>
-              <a:t>center </a:t>
-            </a:r>
-            <a:r>
-              <a:rPr lang="en-US" dirty="0"/>
-              <a:t>on the other side of the planet, or on the other side of a congested network, then you might find it sluggish compared to a local </a:t>
-            </a:r>
-            <a:r>
-              <a:rPr lang="en-US" dirty="0" smtClean="0"/>
-              <a:t>connection</a:t>
-            </a:r>
-          </a:p>
-          <a:p>
-            <a:r>
-              <a:rPr lang="en-US" dirty="0"/>
-              <a:t>Secondly, there is the issue of data sovereignty</a:t>
-            </a:r>
+          <a:p>
+            <a:r>
+              <a:rPr lang="en-US" dirty="0"/>
+              <a:t>Who knows when; who knows for how long. </a:t>
+            </a:r>
+            <a:endParaRPr lang="en-PK" dirty="0"/>
           </a:p>
         </p:txBody>
       </p:sp>
     </p:spTree>
     <p:extLst>
       <p:ext uri="{BB962C8B-B14F-4D97-AF65-F5344CB8AC3E}">
-        <p14:creationId xmlns:p14="http://schemas.microsoft.com/office/powerpoint/2010/main" val="3404700170"/>
+        <p14:creationId xmlns:p14="http://schemas.microsoft.com/office/powerpoint/2010/main" val="4079571140"/>
       </p:ext>
     </p:extLst>
   </p:cSld>
@@ -3759,6 +3721,28 @@
       </p:grpSpPr>
       <p:sp>
         <p:nvSpPr>
+          <p:cNvPr id="2" name="Title 1"/>
+          <p:cNvSpPr>
+            <a:spLocks noGrp="1"/>
+          </p:cNvSpPr>
+          <p:nvPr>
+            <p:ph type="title"/>
+          </p:nvPr>
+        </p:nvSpPr>
+        <p:spPr/>
+        <p:txBody>
+          <a:bodyPr/>
+          <a:lstStyle/>
+          <a:p>
+            <a:r>
+              <a:rPr lang="en-US" dirty="0"/>
+              <a:t>Geography and Cloud Computing</a:t>
+            </a:r>
+          </a:p>
+        </p:txBody>
+      </p:sp>
+      <p:sp>
+        <p:nvSpPr>
           <p:cNvPr id="3" name="Content Placeholder 2"/>
           <p:cNvSpPr>
             <a:spLocks noGrp="1"/>
@@ -3767,65 +3751,42 @@
             <p:ph idx="1"/>
           </p:nvPr>
         </p:nvSpPr>
-        <p:spPr>
-          <a:xfrm>
-            <a:off x="457200" y="381000"/>
-            <a:ext cx="8229600" cy="5638800"/>
-          </a:xfrm>
-        </p:spPr>
+        <p:spPr/>
         <p:txBody>
           <a:bodyPr>
-            <a:normAutofit fontScale="92500" lnSpcReduction="10000"/>
+            <a:normAutofit fontScale="85000" lnSpcReduction="10000"/>
           </a:bodyPr>
           <a:lstStyle/>
           <a:p>
             <a:r>
               <a:rPr lang="en-US" dirty="0"/>
-              <a:t>Many companies, particularly in Europe, have to worry about where their data is being processed and </a:t>
-            </a:r>
-            <a:r>
-              <a:rPr lang="en-US" dirty="0" smtClean="0"/>
-              <a:t>stored</a:t>
-            </a:r>
-          </a:p>
-          <a:p>
-            <a:r>
-              <a:rPr lang="en-US" dirty="0" smtClean="0"/>
-              <a:t>European </a:t>
-            </a:r>
-            <a:r>
-              <a:rPr lang="en-US" dirty="0"/>
-              <a:t>companies are worried that, for example, if their customer data is being stored in data </a:t>
-            </a:r>
-            <a:r>
-              <a:rPr lang="en-US" dirty="0" err="1"/>
-              <a:t>centres</a:t>
-            </a:r>
-            <a:r>
-              <a:rPr lang="en-US" dirty="0"/>
-              <a:t> in the US or (owned by US companies), it could be accessed by US law </a:t>
-            </a:r>
-            <a:r>
-              <a:rPr lang="en-US" dirty="0" smtClean="0"/>
-              <a:t>enforcement</a:t>
-            </a:r>
-          </a:p>
-          <a:p>
-            <a:r>
-              <a:rPr lang="en-US" dirty="0" smtClean="0"/>
-              <a:t>As </a:t>
-            </a:r>
-            <a:r>
-              <a:rPr lang="en-US" dirty="0"/>
-              <a:t>a result, the big cloud vendors have been building out a regional data </a:t>
-            </a:r>
-            <a:r>
-              <a:rPr lang="en-US" dirty="0" err="1"/>
-              <a:t>centre</a:t>
-            </a:r>
-            <a:r>
-              <a:rPr lang="en-US" dirty="0"/>
-              <a:t> network so that organizations can keep their data in their own region.</a:t>
+              <a:t>Geopolitics is forcing significant changes on cloud-computing users and vendors</a:t>
+            </a:r>
+          </a:p>
+          <a:p>
+            <a:r>
+              <a:rPr lang="en-US" dirty="0"/>
+              <a:t>Firstly, there is the issue of latency: if the application is coming from a data center on the other side of the planet, or on the other side of a congested network, then you might find it sluggish compared to a local connection</a:t>
+            </a:r>
+          </a:p>
+          <a:p>
+            <a:r>
+              <a:rPr lang="en-US" dirty="0"/>
+              <a:t>Secondly, there is the issue of </a:t>
+            </a:r>
+            <a:r>
+              <a:rPr lang="en-US" dirty="0">
+                <a:solidFill>
+                  <a:srgbClr val="FF0000"/>
+                </a:solidFill>
+              </a:rPr>
+              <a:t>Data sovereignty </a:t>
+            </a:r>
+          </a:p>
+          <a:p>
+            <a:r>
+              <a:rPr lang="en-US" dirty="0"/>
+              <a:t>Data sovereignty is the concept that information which has been converted and stored in binary digital form is subject to the laws of the country in which it is located</a:t>
             </a:r>
           </a:p>
         </p:txBody>
@@ -3833,7 +3794,7 @@
     </p:spTree>
     <p:extLst>
       <p:ext uri="{BB962C8B-B14F-4D97-AF65-F5344CB8AC3E}">
-        <p14:creationId xmlns:p14="http://schemas.microsoft.com/office/powerpoint/2010/main" val="1930103432"/>
+        <p14:creationId xmlns:p14="http://schemas.microsoft.com/office/powerpoint/2010/main" val="3404700170"/>
       </p:ext>
     </p:extLst>
   </p:cSld>
@@ -3862,128 +3823,57 @@
       </p:grpSpPr>
       <p:sp>
         <p:nvSpPr>
-          <p:cNvPr id="2" name="Title 1"/>
-          <p:cNvSpPr>
-            <a:spLocks noGrp="1"/>
-          </p:cNvSpPr>
-          <p:nvPr>
-            <p:ph type="title"/>
-          </p:nvPr>
-        </p:nvSpPr>
-        <p:spPr/>
+          <p:cNvPr id="3" name="Content Placeholder 2"/>
+          <p:cNvSpPr>
+            <a:spLocks noGrp="1"/>
+          </p:cNvSpPr>
+          <p:nvPr>
+            <p:ph idx="1"/>
+          </p:nvPr>
+        </p:nvSpPr>
+        <p:spPr>
+          <a:xfrm>
+            <a:off x="457200" y="381000"/>
+            <a:ext cx="8229600" cy="5638800"/>
+          </a:xfrm>
+        </p:spPr>
         <p:txBody>
           <a:bodyPr>
-            <a:normAutofit fontScale="90000"/>
+            <a:normAutofit fontScale="92500" lnSpcReduction="10000"/>
           </a:bodyPr>
           <a:lstStyle/>
           <a:p>
             <a:r>
-              <a:rPr lang="en-US" dirty="0" smtClean="0"/>
-              <a:t>Cloud-computing </a:t>
-            </a:r>
-            <a:r>
-              <a:rPr lang="en-US" dirty="0"/>
-              <a:t>region?  availability zone</a:t>
-            </a:r>
-            <a:r>
-              <a:rPr lang="en-US" dirty="0" smtClean="0"/>
-              <a:t>?</a:t>
-            </a:r>
-            <a:endParaRPr lang="en-US" dirty="0"/>
-          </a:p>
-        </p:txBody>
-      </p:sp>
-      <p:sp>
-        <p:nvSpPr>
-          <p:cNvPr id="3" name="Content Placeholder 2"/>
-          <p:cNvSpPr>
-            <a:spLocks noGrp="1"/>
-          </p:cNvSpPr>
-          <p:nvPr>
-            <p:ph idx="1"/>
-          </p:nvPr>
-        </p:nvSpPr>
-        <p:spPr/>
-        <p:txBody>
-          <a:bodyPr>
-            <a:normAutofit lnSpcReduction="10000"/>
-          </a:bodyPr>
-          <a:lstStyle/>
-          <a:p>
-            <a:r>
-              <a:rPr lang="en-US" dirty="0"/>
-              <a:t>Cloud-computing services are operated from giant datacenters around the </a:t>
-            </a:r>
-            <a:r>
-              <a:rPr lang="en-US" dirty="0" smtClean="0"/>
-              <a:t>world</a:t>
-            </a:r>
-          </a:p>
-          <a:p>
-            <a:r>
-              <a:rPr lang="en-US" dirty="0" smtClean="0"/>
-              <a:t>Cloud service vendors often divides these datacenters by '</a:t>
-            </a:r>
-            <a:r>
-              <a:rPr lang="en-US" dirty="0" smtClean="0">
-                <a:solidFill>
-                  <a:srgbClr val="FF0000"/>
-                </a:solidFill>
-              </a:rPr>
-              <a:t>regions</a:t>
-            </a:r>
-            <a:r>
-              <a:rPr lang="en-US" dirty="0" smtClean="0"/>
-              <a:t>' and '</a:t>
-            </a:r>
-            <a:r>
-              <a:rPr lang="en-US" dirty="0" smtClean="0">
-                <a:solidFill>
-                  <a:srgbClr val="FF0000"/>
-                </a:solidFill>
-              </a:rPr>
-              <a:t>availability zones</a:t>
-            </a:r>
-            <a:r>
-              <a:rPr lang="en-US" dirty="0" smtClean="0"/>
-              <a:t>‘</a:t>
-            </a:r>
-          </a:p>
-          <a:p>
-            <a:r>
-              <a:rPr lang="en-US" dirty="0"/>
-              <a:t>Each </a:t>
-            </a:r>
-            <a:r>
-              <a:rPr lang="en-US" dirty="0" smtClean="0"/>
-              <a:t>region </a:t>
-            </a:r>
-            <a:r>
-              <a:rPr lang="en-US" dirty="0"/>
-              <a:t>is a separate geographic area, like EU (London) or US West (Oregon), which </a:t>
-            </a:r>
-            <a:r>
-              <a:rPr lang="en-US" dirty="0" smtClean="0"/>
-              <a:t>then </a:t>
-            </a:r>
-            <a:r>
-              <a:rPr lang="en-US" dirty="0"/>
-              <a:t>further subdivides into what it calls availability zones (AZs</a:t>
-            </a:r>
-            <a:r>
-              <a:rPr lang="en-US" dirty="0" smtClean="0"/>
-              <a:t>)</a:t>
-            </a:r>
-          </a:p>
-          <a:p>
-            <a:endParaRPr lang="en-US" dirty="0"/>
+              <a:rPr lang="en-US" dirty="0"/>
+              <a:t>Many companies, particularly in Europe, have to worry about where their data is being processed and stored</a:t>
+            </a:r>
+          </a:p>
+          <a:p>
+            <a:r>
+              <a:rPr lang="en-US" dirty="0"/>
+              <a:t>European companies are worried that, for example, if their customer data is being stored in data </a:t>
+            </a:r>
+            <a:r>
+              <a:rPr lang="en-US" dirty="0" err="1"/>
+              <a:t>centres</a:t>
+            </a:r>
+            <a:r>
+              <a:rPr lang="en-US" dirty="0"/>
+              <a:t> in the US or (owned by US companies), it could be accessed by US law enforcement</a:t>
+            </a:r>
+          </a:p>
+          <a:p>
+            <a:r>
+              <a:rPr lang="en-US" dirty="0"/>
+              <a:t>As a result, the big cloud vendors have been building out a regional data center network so that organizations can keep their data in their own region.</a:t>
+            </a:r>
           </a:p>
         </p:txBody>
       </p:sp>
     </p:spTree>
     <p:extLst>
       <p:ext uri="{BB962C8B-B14F-4D97-AF65-F5344CB8AC3E}">
-        <p14:creationId xmlns:p14="http://schemas.microsoft.com/office/powerpoint/2010/main" val="1730893933"/>
+        <p14:creationId xmlns:p14="http://schemas.microsoft.com/office/powerpoint/2010/main" val="1930103432"/>
       </p:ext>
     </p:extLst>
   </p:cSld>
@@ -4029,56 +3919,78 @@
           <a:p>
             <a:r>
               <a:rPr lang="en-US" dirty="0"/>
-              <a:t>C</a:t>
-            </a:r>
-            <a:r>
-              <a:rPr lang="en-US" dirty="0" smtClean="0"/>
-              <a:t>loud-computing region?  availability zone?</a:t>
-            </a:r>
+              <a:t>Cloud-computing region?  availability zone?</a:t>
+            </a:r>
+          </a:p>
+        </p:txBody>
+      </p:sp>
+      <p:sp>
+        <p:nvSpPr>
+          <p:cNvPr id="3" name="Content Placeholder 2"/>
+          <p:cNvSpPr>
+            <a:spLocks noGrp="1"/>
+          </p:cNvSpPr>
+          <p:nvPr>
+            <p:ph idx="1"/>
+          </p:nvPr>
+        </p:nvSpPr>
+        <p:spPr/>
+        <p:txBody>
+          <a:bodyPr>
+            <a:normAutofit lnSpcReduction="10000"/>
+          </a:bodyPr>
+          <a:lstStyle/>
+          <a:p>
+            <a:r>
+              <a:rPr lang="en-US" dirty="0"/>
+              <a:t>Cloud-computing services are operated from giant datacenters around the world</a:t>
+            </a:r>
+          </a:p>
+          <a:p>
+            <a:r>
+              <a:rPr lang="en-US" dirty="0"/>
+              <a:t>Cloud service vendors often divides these datacenters by '</a:t>
+            </a:r>
+            <a:r>
+              <a:rPr lang="en-US" dirty="0">
+                <a:solidFill>
+                  <a:srgbClr val="FF0000"/>
+                </a:solidFill>
+              </a:rPr>
+              <a:t>regions</a:t>
+            </a:r>
+            <a:r>
+              <a:rPr lang="en-US" dirty="0"/>
+              <a:t>' and '</a:t>
+            </a:r>
+            <a:r>
+              <a:rPr lang="en-US" dirty="0">
+                <a:solidFill>
+                  <a:srgbClr val="FF0000"/>
+                </a:solidFill>
+              </a:rPr>
+              <a:t>availability zones</a:t>
+            </a:r>
+            <a:r>
+              <a:rPr lang="en-US" dirty="0"/>
+              <a:t>‘</a:t>
+            </a:r>
+          </a:p>
+          <a:p>
+            <a:r>
+              <a:rPr lang="en-US" dirty="0"/>
+              <a:t>Each region is a separate geographic area, like EU (London) or US West (Oregon), which then further subdivides into what it calls availability zones (AZs)</a:t>
+            </a:r>
+          </a:p>
+          <a:p>
             <a:endParaRPr lang="en-US" dirty="0"/>
-          </a:p>
-        </p:txBody>
-      </p:sp>
-      <p:sp>
-        <p:nvSpPr>
-          <p:cNvPr id="3" name="Content Placeholder 2"/>
-          <p:cNvSpPr>
-            <a:spLocks noGrp="1"/>
-          </p:cNvSpPr>
-          <p:nvPr>
-            <p:ph idx="1"/>
-          </p:nvPr>
-        </p:nvSpPr>
-        <p:spPr/>
-        <p:txBody>
-          <a:bodyPr/>
-          <a:lstStyle/>
-          <a:p>
-            <a:r>
-              <a:rPr lang="en-US" dirty="0"/>
-              <a:t>An AZ is composed of one or more datacenters that are far enough apart that in theory a single disaster won't take both offline, but close enough together for business continuity applications that require rapid </a:t>
-            </a:r>
-            <a:r>
-              <a:rPr lang="en-US" dirty="0" smtClean="0"/>
-              <a:t>failover</a:t>
-            </a:r>
-          </a:p>
-          <a:p>
-            <a:r>
-              <a:rPr lang="en-US" dirty="0" smtClean="0"/>
-              <a:t>Each </a:t>
-            </a:r>
-            <a:r>
-              <a:rPr lang="en-US" dirty="0"/>
-              <a:t>AZ has multiple internet connections and power connections to multiple grids</a:t>
-            </a:r>
           </a:p>
         </p:txBody>
       </p:sp>
     </p:spTree>
     <p:extLst>
       <p:ext uri="{BB962C8B-B14F-4D97-AF65-F5344CB8AC3E}">
-        <p14:creationId xmlns:p14="http://schemas.microsoft.com/office/powerpoint/2010/main" val="2884506776"/>
+        <p14:creationId xmlns:p14="http://schemas.microsoft.com/office/powerpoint/2010/main" val="1730893933"/>
       </p:ext>
     </p:extLst>
   </p:cSld>
@@ -4118,35 +4030,14 @@
         <p:spPr/>
         <p:txBody>
           <a:bodyPr>
-            <a:normAutofit/>
+            <a:normAutofit fontScale="90000"/>
           </a:bodyPr>
           <a:lstStyle/>
           <a:p>
             <a:r>
-              <a:rPr lang="en-US" dirty="0" smtClean="0"/>
-              <a:t>Cloud </a:t>
-            </a:r>
-            <a:r>
-              <a:rPr lang="en-US" dirty="0"/>
-              <a:t>computing </a:t>
-            </a:r>
-            <a:r>
-              <a:rPr lang="en-US" dirty="0" smtClean="0"/>
-              <a:t>model </a:t>
-            </a:r>
-            <a:r>
-              <a:rPr lang="en-US" dirty="0" smtClean="0">
-                <a:solidFill>
-                  <a:srgbClr val="FF0000"/>
-                </a:solidFill>
-              </a:rPr>
-              <a:t>NIST</a:t>
-            </a:r>
-            <a:endParaRPr lang="en-US" dirty="0">
-              <a:solidFill>
-                <a:srgbClr val="FF0000"/>
-              </a:solidFill>
-            </a:endParaRPr>
+              <a:rPr lang="en-US" dirty="0"/>
+              <a:t>Cloud-computing region?  availability zone?</a:t>
+            </a:r>
           </a:p>
         </p:txBody>
       </p:sp>
@@ -4162,51 +4053,18 @@
         </p:nvSpPr>
         <p:spPr/>
         <p:txBody>
-          <a:bodyPr>
-            <a:normAutofit fontScale="92500"/>
-          </a:bodyPr>
-          <a:lstStyle/>
-          <a:p>
-            <a:r>
-              <a:rPr lang="en-US" dirty="0"/>
-              <a:t>According to the </a:t>
-            </a:r>
-            <a:r>
-              <a:rPr lang="en-US" dirty="0">
-                <a:solidFill>
-                  <a:srgbClr val="FF0000"/>
-                </a:solidFill>
-              </a:rPr>
-              <a:t>National Institute of Standards and Technologies (NIST</a:t>
-            </a:r>
-            <a:r>
-              <a:rPr lang="en-US" dirty="0" smtClean="0">
-                <a:solidFill>
-                  <a:srgbClr val="FF0000"/>
-                </a:solidFill>
-              </a:rPr>
-              <a:t>) </a:t>
-            </a:r>
-          </a:p>
-          <a:p>
-            <a:pPr marL="0" indent="0" algn="just">
-              <a:buNone/>
-            </a:pPr>
-            <a:r>
-              <a:rPr lang="en-US" i="1" dirty="0" smtClean="0"/>
-              <a:t>cloud </a:t>
-            </a:r>
-            <a:r>
-              <a:rPr lang="en-US" i="1" dirty="0"/>
-              <a:t>computing is a model for enabling </a:t>
-            </a:r>
-            <a:r>
-              <a:rPr lang="en-US" i="1" dirty="0" smtClean="0"/>
-              <a:t>ubiquitous, convenient, </a:t>
-            </a:r>
-            <a:r>
-              <a:rPr lang="en-US" i="1" dirty="0"/>
-              <a:t>on-demand network access to a shared pool of configurable computing resources (networks, servers, storage, applications, and services) that can be rapidly provisioned and released with minimal management effort or service provider interaction</a:t>
+          <a:bodyPr/>
+          <a:lstStyle/>
+          <a:p>
+            <a:r>
+              <a:rPr lang="en-US" dirty="0"/>
+              <a:t>An AZ is composed of one or more datacenters that are far enough apart that in theory a single disaster won't take both offline, but close enough together for business continuity applications that require rapid failover</a:t>
+            </a:r>
+          </a:p>
+          <a:p>
+            <a:r>
+              <a:rPr lang="en-US" dirty="0"/>
+              <a:t>Each AZ has multiple internet connections and power connections to multiple grids</a:t>
             </a:r>
           </a:p>
         </p:txBody>
@@ -4214,7 +4072,7 @@
     </p:spTree>
     <p:extLst>
       <p:ext uri="{BB962C8B-B14F-4D97-AF65-F5344CB8AC3E}">
-        <p14:creationId xmlns:p14="http://schemas.microsoft.com/office/powerpoint/2010/main" val="1819826976"/>
+        <p14:creationId xmlns:p14="http://schemas.microsoft.com/office/powerpoint/2010/main" val="2884506776"/>
       </p:ext>
     </p:extLst>
   </p:cSld>
@@ -4267,49 +4125,25 @@
               <a:buNone/>
             </a:pPr>
             <a:r>
-              <a:rPr lang="en-US" dirty="0" smtClean="0"/>
-              <a:t>in </a:t>
-            </a:r>
-            <a:r>
-              <a:rPr lang="en-US" dirty="0"/>
-              <a:t>1961 </a:t>
-            </a:r>
-            <a:r>
-              <a:rPr lang="en-US" dirty="0" smtClean="0"/>
-              <a:t>computer </a:t>
-            </a:r>
-            <a:r>
-              <a:rPr lang="en-US" dirty="0"/>
-              <a:t>scientist John </a:t>
-            </a:r>
-            <a:r>
-              <a:rPr lang="en-US" dirty="0" smtClean="0"/>
-              <a:t>McCarthy said: </a:t>
+              <a:rPr lang="en-US" dirty="0"/>
+              <a:t>In 1961 computer scientist John McCarthy said: </a:t>
             </a:r>
             <a:br>
-              <a:rPr lang="en-US" dirty="0" smtClean="0"/>
+              <a:rPr lang="en-US" dirty="0"/>
             </a:br>
-            <a:endParaRPr lang="en-US" i="1" dirty="0" smtClean="0"/>
+            <a:endParaRPr lang="en-US" i="1" dirty="0"/>
           </a:p>
           <a:p>
             <a:pPr marL="0" indent="0">
               <a:buNone/>
             </a:pPr>
-            <a:r>
-              <a:rPr lang="en-US" i="1" dirty="0" smtClean="0">
-                <a:solidFill>
-                  <a:srgbClr val="FF0000"/>
-                </a:solidFill>
-              </a:rPr>
-              <a:t>“</a:t>
-            </a:r>
             <a:r>
               <a:rPr lang="en-US" i="1" dirty="0">
                 <a:solidFill>
                   <a:srgbClr val="FF0000"/>
                 </a:solidFill>
               </a:rPr>
-              <a:t>If computers of the kind I have advocated become the computers of the future, then</a:t>
+              <a:t>“If computers of the kind I have advocated become the computers of the future, then</a:t>
             </a:r>
             <a:br>
               <a:rPr lang="en-US" i="1" dirty="0">
@@ -4339,22 +4173,10 @@
                   <a:srgbClr val="FF0000"/>
                 </a:solidFill>
               </a:rPr>
-              <a:t>public utility… The computer utility could become the basis of a new and important industry.”</a:t>
-            </a:r>
-            <a:r>
-              <a:rPr lang="en-US" i="1" dirty="0" smtClean="0">
-                <a:solidFill>
-                  <a:srgbClr val="FF0000"/>
-                </a:solidFill>
-              </a:rPr>
-              <a:t> </a:t>
-            </a:r>
-            <a:r>
-              <a:rPr lang="en-US" dirty="0" smtClean="0"/>
-              <a:t/>
+              <a:t>public utility… The computer utility could become the basis of a new and important industry.” </a:t>
             </a:r>
             <a:br>
-              <a:rPr lang="en-US" dirty="0" smtClean="0"/>
+              <a:rPr lang="en-US" dirty="0"/>
             </a:br>
             <a:endParaRPr lang="en-US" dirty="0"/>
           </a:p>
@@ -4403,13 +4225,21 @@
         <p:spPr/>
         <p:txBody>
           <a:bodyPr>
-            <a:normAutofit fontScale="90000"/>
+            <a:normAutofit/>
           </a:bodyPr>
           <a:lstStyle/>
           <a:p>
             <a:r>
               <a:rPr lang="en-US" dirty="0"/>
-              <a:t>This cloud model is composed of five essential characteristics:</a:t>
+              <a:t>Cloud computing model </a:t>
+            </a:r>
+            <a:r>
+              <a:rPr lang="en-US" dirty="0">
+                <a:solidFill>
+                  <a:srgbClr val="FF0000"/>
+                </a:solidFill>
+              </a:rPr>
+              <a:t>NIST</a:t>
             </a:r>
           </a:p>
         </p:txBody>
@@ -4426,47 +4256,39 @@
         </p:nvSpPr>
         <p:spPr/>
         <p:txBody>
-          <a:bodyPr/>
-          <a:lstStyle/>
-          <a:p>
-            <a:r>
-              <a:rPr lang="en-US" dirty="0"/>
-              <a:t>On-demand self-service</a:t>
-            </a:r>
-          </a:p>
-          <a:p>
-            <a:r>
-              <a:rPr lang="en-US" dirty="0"/>
-              <a:t>Broad network access</a:t>
-            </a:r>
-          </a:p>
-          <a:p>
-            <a:r>
-              <a:rPr lang="en-US" dirty="0"/>
-              <a:t>Resource pooling</a:t>
-            </a:r>
-          </a:p>
-          <a:p>
-            <a:r>
-              <a:rPr lang="en-US" dirty="0"/>
-              <a:t>Rapid elasticity</a:t>
-            </a:r>
-          </a:p>
-          <a:p>
-            <a:r>
-              <a:rPr lang="en-US" dirty="0"/>
-              <a:t>Measured Service</a:t>
-            </a:r>
-          </a:p>
-          <a:p>
-            <a:endParaRPr lang="en-US" dirty="0"/>
+          <a:bodyPr>
+            <a:normAutofit fontScale="92500"/>
+          </a:bodyPr>
+          <a:lstStyle/>
+          <a:p>
+            <a:r>
+              <a:rPr lang="en-US" dirty="0"/>
+              <a:t>According to the </a:t>
+            </a:r>
+            <a:r>
+              <a:rPr lang="en-US" dirty="0">
+                <a:solidFill>
+                  <a:srgbClr val="FF0000"/>
+                </a:solidFill>
+              </a:rPr>
+              <a:t>National Institute of Standards and Technologies (NIST) </a:t>
+            </a:r>
+          </a:p>
+          <a:p>
+            <a:pPr marL="0" indent="0" algn="just">
+              <a:buNone/>
+            </a:pPr>
+            <a:r>
+              <a:rPr lang="en-US" i="1" dirty="0"/>
+              <a:t>cloud computing is a model for enabling ubiquitous, convenient, on-demand network access to a shared pool of configurable computing resources (networks, servers, storage, applications, and services) that can be rapidly provisioned and released with minimal management effort or service provider interaction</a:t>
+            </a:r>
           </a:p>
         </p:txBody>
       </p:sp>
     </p:spTree>
     <p:extLst>
       <p:ext uri="{BB962C8B-B14F-4D97-AF65-F5344CB8AC3E}">
-        <p14:creationId xmlns:p14="http://schemas.microsoft.com/office/powerpoint/2010/main" val="333079511"/>
+        <p14:creationId xmlns:p14="http://schemas.microsoft.com/office/powerpoint/2010/main" val="1819826976"/>
       </p:ext>
     </p:extLst>
   </p:cSld>
@@ -4495,6 +4317,30 @@
       </p:grpSpPr>
       <p:sp>
         <p:nvSpPr>
+          <p:cNvPr id="2" name="Title 1"/>
+          <p:cNvSpPr>
+            <a:spLocks noGrp="1"/>
+          </p:cNvSpPr>
+          <p:nvPr>
+            <p:ph type="title"/>
+          </p:nvPr>
+        </p:nvSpPr>
+        <p:spPr/>
+        <p:txBody>
+          <a:bodyPr>
+            <a:normAutofit fontScale="90000"/>
+          </a:bodyPr>
+          <a:lstStyle/>
+          <a:p>
+            <a:r>
+              <a:rPr lang="en-US" dirty="0"/>
+              <a:t>This cloud model is composed of five essential characteristics:</a:t>
+            </a:r>
+          </a:p>
+        </p:txBody>
+      </p:sp>
+      <p:sp>
+        <p:nvSpPr>
           <p:cNvPr id="3" name="Content Placeholder 2"/>
           <p:cNvSpPr>
             <a:spLocks noGrp="1"/>
@@ -4503,12 +4349,7 @@
             <p:ph idx="1"/>
           </p:nvPr>
         </p:nvSpPr>
-        <p:spPr>
-          <a:xfrm>
-            <a:off x="457200" y="228600"/>
-            <a:ext cx="8229600" cy="6324600"/>
-          </a:xfrm>
-        </p:spPr>
+        <p:spPr/>
         <p:txBody>
           <a:bodyPr>
             <a:normAutofit/>
@@ -4516,69 +4357,32 @@
           <a:lstStyle/>
           <a:p>
             <a:r>
-              <a:rPr lang="en-US" dirty="0">
-                <a:solidFill>
-                  <a:srgbClr val="FF0000"/>
-                </a:solidFill>
-              </a:rPr>
+              <a:rPr lang="en-US" dirty="0"/>
               <a:t>On-demand self-service</a:t>
             </a:r>
-            <a:r>
-              <a:rPr lang="en-US" dirty="0"/>
-              <a:t>: Users are able to provision cloud computing resources without requiring human interaction, mostly done </a:t>
-            </a:r>
-            <a:r>
-              <a:rPr lang="en-US" dirty="0" smtClean="0"/>
-              <a:t>though </a:t>
-            </a:r>
-            <a:r>
-              <a:rPr lang="en-US" dirty="0"/>
-              <a:t>a web-based self-service </a:t>
-            </a:r>
-            <a:r>
-              <a:rPr lang="en-US" dirty="0" smtClean="0"/>
-              <a:t>portal</a:t>
-            </a:r>
-          </a:p>
-          <a:p>
-            <a:endParaRPr lang="en-US" i="1" dirty="0" smtClean="0">
-              <a:solidFill>
-                <a:srgbClr val="FF0000"/>
-              </a:solidFill>
-            </a:endParaRPr>
-          </a:p>
-          <a:p>
-            <a:r>
-              <a:rPr lang="en-US" i="1" dirty="0" smtClean="0">
-                <a:solidFill>
-                  <a:srgbClr val="FF0000"/>
-                </a:solidFill>
-              </a:rPr>
-              <a:t>Broad </a:t>
-            </a:r>
-            <a:r>
-              <a:rPr lang="en-US" i="1" dirty="0">
-                <a:solidFill>
-                  <a:srgbClr val="FF0000"/>
-                </a:solidFill>
-              </a:rPr>
-              <a:t>network </a:t>
-            </a:r>
-            <a:r>
-              <a:rPr lang="en-US" i="1" dirty="0" smtClean="0">
-                <a:solidFill>
-                  <a:srgbClr val="FF0000"/>
-                </a:solidFill>
-              </a:rPr>
-              <a:t>access: </a:t>
-            </a:r>
-            <a:r>
-              <a:rPr lang="en-US" dirty="0" smtClean="0"/>
-              <a:t>Capabilities </a:t>
-            </a:r>
-            <a:r>
-              <a:rPr lang="en-US" dirty="0"/>
-              <a:t>are available over the network and accessed through standard mechanisms that promote use by heterogeneous thin or thick client platforms (e.g., mobile phones, tablets, laptops, and workstations).</a:t>
+          </a:p>
+          <a:p>
+            <a:r>
+              <a:rPr lang="en-US" dirty="0"/>
+              <a:t>Resource pooling</a:t>
+            </a:r>
+          </a:p>
+          <a:p>
+            <a:r>
+              <a:rPr lang="en-US" dirty="0"/>
+              <a:t>Rapid elasticity</a:t>
+            </a:r>
+          </a:p>
+          <a:p>
+            <a:r>
+              <a:rPr lang="en-US" dirty="0"/>
+              <a:t>Measured Service</a:t>
+            </a:r>
+          </a:p>
+          <a:p>
+            <a:r>
+              <a:rPr lang="en-US" dirty="0"/>
+              <a:t>Broad network access</a:t>
             </a:r>
           </a:p>
           <a:p>
@@ -4589,7 +4393,7 @@
     </p:spTree>
     <p:extLst>
       <p:ext uri="{BB962C8B-B14F-4D97-AF65-F5344CB8AC3E}">
-        <p14:creationId xmlns:p14="http://schemas.microsoft.com/office/powerpoint/2010/main" val="2108146232"/>
+        <p14:creationId xmlns:p14="http://schemas.microsoft.com/office/powerpoint/2010/main" val="333079511"/>
       </p:ext>
     </p:extLst>
   </p:cSld>
@@ -4628,8 +4432,8 @@
         </p:nvSpPr>
         <p:spPr>
           <a:xfrm>
-            <a:off x="533400" y="381000"/>
-            <a:ext cx="8229600" cy="6019800"/>
+            <a:off x="457200" y="228600"/>
+            <a:ext cx="8229600" cy="6324600"/>
           </a:xfrm>
         </p:spPr>
         <p:txBody>
@@ -4637,6 +4441,20 @@
             <a:normAutofit fontScale="92500" lnSpcReduction="20000"/>
           </a:bodyPr>
           <a:lstStyle/>
+          <a:p>
+            <a:r>
+              <a:rPr lang="en-US" dirty="0">
+                <a:solidFill>
+                  <a:srgbClr val="FF0000"/>
+                </a:solidFill>
+              </a:rPr>
+              <a:t>On-demand self-service</a:t>
+            </a:r>
+            <a:r>
+              <a:rPr lang="en-US" dirty="0"/>
+              <a:t>: Users are able to provision cloud computing resources without requiring human interaction, mostly done though a web-based self-service portal</a:t>
+            </a:r>
+          </a:p>
           <a:p>
             <a:r>
               <a:rPr lang="en-US" dirty="0">
@@ -4648,11 +4466,7 @@
             </a:r>
             <a:r>
               <a:rPr lang="en-US" dirty="0"/>
-              <a:t>Service multiple customers from the same physical resources, by securely separating the resources on logical level</a:t>
-            </a:r>
-            <a:r>
-              <a:rPr lang="en-US" dirty="0" smtClean="0"/>
-              <a:t>.</a:t>
+              <a:t>Service multiple customers from the same physical resources, by securely separating the resources on logical level.</a:t>
             </a:r>
           </a:p>
           <a:p>
@@ -4666,21 +4480,62 @@
             </a:r>
             <a:r>
               <a:rPr lang="en-US" dirty="0"/>
-              <a:t>Resources are provisioned and released on-demand and/or automated based on triggers or parameters. This will make sure your application will have exactly the capacity it needs at any point of time</a:t>
-            </a:r>
-            <a:r>
-              <a:rPr lang="en-US" dirty="0" smtClean="0"/>
-              <a:t>.</a:t>
-            </a:r>
-            <a:r>
-              <a:rPr lang="en-US" dirty="0"/>
-              <a:t>  To the consumer, the capabilities available for provisioning often appear to be unlimited and can be appropriated in any quantity at any time</a:t>
-            </a:r>
-            <a:r>
-              <a:rPr lang="en-US" dirty="0" smtClean="0"/>
-              <a:t>.</a:t>
-            </a:r>
-          </a:p>
+              <a:t>Resources are provisioned and released on-demand and/or automated based on triggers or parameters. This will make sure your application will have exactly the capacity it needs at any point of time.  To the consumer, the capabilities available for provisioning often appear to be unlimited and can be appropriated in any quantity at any time</a:t>
+            </a:r>
+          </a:p>
+        </p:txBody>
+      </p:sp>
+    </p:spTree>
+    <p:extLst>
+      <p:ext uri="{BB962C8B-B14F-4D97-AF65-F5344CB8AC3E}">
+        <p14:creationId xmlns:p14="http://schemas.microsoft.com/office/powerpoint/2010/main" val="2108146232"/>
+      </p:ext>
+    </p:extLst>
+  </p:cSld>
+  <p:clrMapOvr>
+    <a:masterClrMapping/>
+  </p:clrMapOvr>
+</p:sld>
+</file>
+
+<file path=ppt/slides/slide23.xml><?xml version="1.0" encoding="utf-8"?>
+<p:sld xmlns:a="http://schemas.openxmlformats.org/drawingml/2006/main" xmlns:r="http://schemas.openxmlformats.org/officeDocument/2006/relationships" xmlns:p="http://schemas.openxmlformats.org/presentationml/2006/main">
+  <p:cSld>
+    <p:spTree>
+      <p:nvGrpSpPr>
+        <p:cNvPr id="1" name=""/>
+        <p:cNvGrpSpPr/>
+        <p:nvPr/>
+      </p:nvGrpSpPr>
+      <p:grpSpPr>
+        <a:xfrm>
+          <a:off x="0" y="0"/>
+          <a:ext cx="0" cy="0"/>
+          <a:chOff x="0" y="0"/>
+          <a:chExt cx="0" cy="0"/>
+        </a:xfrm>
+      </p:grpSpPr>
+      <p:sp>
+        <p:nvSpPr>
+          <p:cNvPr id="3" name="Content Placeholder 2"/>
+          <p:cNvSpPr>
+            <a:spLocks noGrp="1"/>
+          </p:cNvSpPr>
+          <p:nvPr>
+            <p:ph idx="1"/>
+          </p:nvPr>
+        </p:nvSpPr>
+        <p:spPr>
+          <a:xfrm>
+            <a:off x="533400" y="381000"/>
+            <a:ext cx="8229600" cy="6019800"/>
+          </a:xfrm>
+        </p:spPr>
+        <p:txBody>
+          <a:bodyPr>
+            <a:normAutofit/>
+          </a:bodyPr>
+          <a:lstStyle/>
           <a:p>
             <a:r>
               <a:rPr lang="en-US" dirty="0">
@@ -4692,8 +4547,37 @@
             </a:r>
             <a:r>
               <a:rPr lang="en-US" dirty="0"/>
-              <a:t>Resource usage are monitored, measured, and reported (billed) transparently based on utilization. In short, pay for use.</a:t>
-            </a:r>
+              <a:t>Resource usage are monitored, measured, and reported (billed) transparently based on utilization. In short, pay per use.</a:t>
+            </a:r>
+            <a:endParaRPr lang="en-US" i="1" dirty="0">
+              <a:solidFill>
+                <a:srgbClr val="FF0000"/>
+              </a:solidFill>
+            </a:endParaRPr>
+          </a:p>
+          <a:p>
+            <a:endParaRPr lang="en-US" i="1" dirty="0">
+              <a:solidFill>
+                <a:srgbClr val="FF0000"/>
+              </a:solidFill>
+            </a:endParaRPr>
+          </a:p>
+          <a:p>
+            <a:r>
+              <a:rPr lang="en-US" i="1" dirty="0">
+                <a:solidFill>
+                  <a:srgbClr val="FF0000"/>
+                </a:solidFill>
+              </a:rPr>
+              <a:t>Broad network access: </a:t>
+            </a:r>
+            <a:r>
+              <a:rPr lang="en-US" dirty="0"/>
+              <a:t>Capabilities are available over the network and accessed through standard mechanisms that promote use by heterogeneous thin or thick client platforms (e.g., mobile phones, tablets, laptops, and workstations).</a:t>
+            </a:r>
+          </a:p>
+          <a:p>
+            <a:endParaRPr lang="en-US" dirty="0"/>
           </a:p>
         </p:txBody>
       </p:sp>
@@ -4791,6 +4675,72 @@
           </a:extLst>
         </p:spPr>
       </p:pic>
+      <p:sp>
+        <p:nvSpPr>
+          <p:cNvPr id="3" name="TextBox 2">
+            <a:extLst>
+              <a:ext uri="{FF2B5EF4-FFF2-40B4-BE49-F238E27FC236}">
+                <a16:creationId xmlns:a16="http://schemas.microsoft.com/office/drawing/2014/main" id="{5A17C3B8-B398-052B-9A63-1E19B82D1CC6}"/>
+              </a:ext>
+            </a:extLst>
+          </p:cNvPr>
+          <p:cNvSpPr txBox="1"/>
+          <p:nvPr/>
+        </p:nvSpPr>
+        <p:spPr>
+          <a:xfrm>
+            <a:off x="2514600" y="5486400"/>
+            <a:ext cx="4572000" cy="1200329"/>
+          </a:xfrm>
+          <a:prstGeom prst="rect">
+            <a:avLst/>
+          </a:prstGeom>
+          <a:noFill/>
+        </p:spPr>
+        <p:txBody>
+          <a:bodyPr wrap="square">
+            <a:spAutoFit/>
+          </a:bodyPr>
+          <a:lstStyle/>
+          <a:p>
+            <a:r>
+              <a:rPr lang="en-US" b="0" i="0" dirty="0">
+                <a:solidFill>
+                  <a:srgbClr val="FF0000"/>
+                </a:solidFill>
+                <a:effectLst/>
+                <a:latin typeface="arial" panose="020B0604020202020204" pitchFamily="34" charset="0"/>
+              </a:rPr>
+              <a:t>According to latest report Public Cloud services and infrastructure market Revenues reached </a:t>
+            </a:r>
+            <a:r>
+              <a:rPr lang="en-US" b="1" i="0" dirty="0">
+                <a:solidFill>
+                  <a:srgbClr val="FF0000"/>
+                </a:solidFill>
+                <a:effectLst/>
+                <a:latin typeface="arial" panose="020B0604020202020204" pitchFamily="34" charset="0"/>
+              </a:rPr>
+              <a:t>$126 billion</a:t>
+            </a:r>
+            <a:r>
+              <a:rPr lang="en-US" b="0" i="0" dirty="0">
+                <a:solidFill>
+                  <a:srgbClr val="FF0000"/>
+                </a:solidFill>
+                <a:effectLst/>
+                <a:latin typeface="arial" panose="020B0604020202020204" pitchFamily="34" charset="0"/>
+              </a:rPr>
+              <a:t> in Q1 2022, a 26 per cent jump from Q1 2021</a:t>
+            </a:r>
+            <a:endParaRPr lang="en-PK" dirty="0">
+              <a:solidFill>
+                <a:srgbClr val="FF0000"/>
+              </a:solidFill>
+            </a:endParaRPr>
+          </a:p>
+        </p:txBody>
+      </p:sp>
     </p:spTree>
     <p:extLst>
       <p:ext uri="{BB962C8B-B14F-4D97-AF65-F5344CB8AC3E}">
@@ -4837,10 +4787,9 @@
           <a:lstStyle/>
           <a:p>
             <a:r>
-              <a:rPr lang="en-US" dirty="0" smtClean="0"/>
+              <a:rPr lang="en-US" dirty="0"/>
               <a:t>What is cloud Computing?</a:t>
             </a:r>
-            <a:endParaRPr lang="en-US" dirty="0"/>
           </a:p>
         </p:txBody>
       </p:sp>
@@ -4861,23 +4810,7 @@
           <a:p>
             <a:r>
               <a:rPr lang="en-US" dirty="0"/>
-              <a:t> </a:t>
-            </a:r>
-            <a:r>
-              <a:rPr lang="en-US" dirty="0" smtClean="0"/>
-              <a:t>Cloud </a:t>
-            </a:r>
-            <a:r>
-              <a:rPr lang="en-US" dirty="0"/>
-              <a:t>computing is the delivery of computing services—including servers, storage, databases, networking, software, analytics, and intelligence—over the Internet (“the cloud</a:t>
-            </a:r>
-            <a:r>
-              <a:rPr lang="en-US" dirty="0" smtClean="0"/>
-              <a:t>”) </a:t>
-            </a:r>
-            <a:r>
-              <a:rPr lang="en-US" dirty="0"/>
-              <a:t>and on a pay-as-you-go basis.</a:t>
+              <a:t> Cloud computing is the delivery of computing services—including servers, storage, databases, networking, software, analytics, and intelligence—over the Internet (“the cloud”) and on a pay-as-you-go basis.</a:t>
             </a:r>
           </a:p>
         </p:txBody>
@@ -4935,16 +4868,8 @@
           <a:lstStyle/>
           <a:p>
             <a:r>
-              <a:rPr lang="en-US" b="1" i="1" dirty="0" smtClean="0"/>
-              <a:t>So How </a:t>
-            </a:r>
-            <a:r>
               <a:rPr lang="en-US" b="1" i="1" dirty="0"/>
-              <a:t>is the cloud different from the traditional client-server model of the Internet?</a:t>
-            </a:r>
-            <a:r>
-              <a:rPr lang="en-US" b="1" dirty="0"/>
-              <a:t/>
+              <a:t>So How is the cloud different from the traditional client-server model of the Internet?</a:t>
             </a:r>
             <a:br>
               <a:rPr lang="en-US" b="1" dirty="0"/>
@@ -5001,15 +4926,15 @@
           <a:lstStyle/>
           <a:p>
             <a:r>
-              <a:rPr lang="en-US" i="1" dirty="0" smtClean="0"/>
+              <a:rPr lang="en-US" i="1" dirty="0"/>
               <a:t>cloud </a:t>
             </a:r>
             <a:r>
-              <a:rPr lang="en-US" i="1" dirty="0" err="1" smtClean="0"/>
+              <a:rPr lang="en-US" i="1" dirty="0" err="1"/>
               <a:t>vs</a:t>
             </a:r>
             <a:r>
-              <a:rPr lang="en-US" i="1" dirty="0" smtClean="0"/>
+              <a:rPr lang="en-US" i="1" dirty="0"/>
               <a:t> traditional client-server model</a:t>
             </a:r>
             <a:endParaRPr lang="en-US" dirty="0"/>
@@ -5035,35 +4960,19 @@
           <a:p>
             <a:r>
               <a:rPr lang="en-US" dirty="0"/>
-              <a:t>The Internet has always been made up of servers, clients, and the infrastructure that connects </a:t>
-            </a:r>
-            <a:r>
-              <a:rPr lang="en-US" dirty="0" smtClean="0"/>
-              <a:t>them </a:t>
-            </a:r>
-          </a:p>
-          <a:p>
-            <a:r>
-              <a:rPr lang="en-US" dirty="0" smtClean="0"/>
-              <a:t>Clients </a:t>
-            </a:r>
-            <a:r>
-              <a:rPr lang="en-US" dirty="0"/>
-              <a:t>make requests of servers, and servers send </a:t>
-            </a:r>
-            <a:r>
-              <a:rPr lang="en-US" dirty="0" smtClean="0"/>
-              <a:t>responses </a:t>
-            </a:r>
-          </a:p>
-          <a:p>
-            <a:r>
-              <a:rPr lang="en-US" dirty="0" smtClean="0"/>
-              <a:t>Cloud </a:t>
-            </a:r>
-            <a:r>
-              <a:rPr lang="en-US" dirty="0"/>
-              <a:t>computing differs from this model in that </a:t>
+              <a:t>The Internet has always been made up of servers, clients, and the infrastructure that connects them </a:t>
+            </a:r>
+          </a:p>
+          <a:p>
+            <a:r>
+              <a:rPr lang="en-US" dirty="0"/>
+              <a:t>Clients make requests of servers, and servers send responses </a:t>
+            </a:r>
+          </a:p>
+          <a:p>
+            <a:r>
+              <a:rPr lang="en-US" dirty="0"/>
+              <a:t>Cloud computing differs from this model in that </a:t>
             </a:r>
             <a:r>
               <a:rPr lang="en-US" i="1" dirty="0">
@@ -5125,13 +5034,8 @@
           <a:p>
             <a:r>
               <a:rPr lang="en-US" dirty="0"/>
-              <a:t>How does cloud computing work</a:t>
-            </a:r>
-            <a:r>
-              <a:rPr lang="en-US" dirty="0" smtClean="0"/>
-              <a:t>?</a:t>
-            </a:r>
-            <a:endParaRPr lang="en-US" dirty="0"/>
+              <a:t>How does cloud computing work?</a:t>
+            </a:r>
           </a:p>
         </p:txBody>
       </p:sp>
@@ -5159,41 +5063,13 @@
           <a:p>
             <a:r>
               <a:rPr lang="en-US" dirty="0"/>
-              <a:t>Rather than owning their own computing infrastructure or data </a:t>
-            </a:r>
-            <a:r>
-              <a:rPr lang="en-US" dirty="0" smtClean="0"/>
-              <a:t>centers, </a:t>
-            </a:r>
-            <a:r>
-              <a:rPr lang="en-US" dirty="0"/>
-              <a:t>companies can rent access to anything from applications to storage from a cloud service </a:t>
-            </a:r>
-            <a:r>
-              <a:rPr lang="en-US" dirty="0" smtClean="0"/>
-              <a:t>provider </a:t>
-            </a:r>
-          </a:p>
-          <a:p>
-            <a:r>
-              <a:rPr lang="en-US" dirty="0" smtClean="0"/>
-              <a:t>They can </a:t>
-            </a:r>
-            <a:r>
-              <a:rPr lang="en-US" dirty="0"/>
-              <a:t>a</a:t>
-            </a:r>
-            <a:r>
-              <a:rPr lang="en-US" dirty="0" smtClean="0"/>
-              <a:t>void </a:t>
-            </a:r>
-            <a:r>
-              <a:rPr lang="en-US" dirty="0"/>
-              <a:t>the upfront cost and complexity of owning and maintaining their own IT infrastructure, and instead simply pay for what they use, when they use it</a:t>
-            </a:r>
-            <a:r>
-              <a:rPr lang="en-US" dirty="0" smtClean="0"/>
-              <a:t>.</a:t>
+              <a:t>Rather than owning their own computing infrastructure or data centers, companies can rent access to anything from applications to storage from a cloud service provider </a:t>
+            </a:r>
+          </a:p>
+          <a:p>
+            <a:r>
+              <a:rPr lang="en-US" dirty="0"/>
+              <a:t>They can avoid the upfront cost and complexity of owning and maintaining their own IT infrastructure, and instead simply pay for what they use, when they use it.</a:t>
             </a:r>
           </a:p>
           <a:p>
@@ -5251,69 +5127,48 @@
           <a:p>
             <a:r>
               <a:rPr lang="en-US" dirty="0"/>
-              <a:t>E</a:t>
-            </a:r>
-            <a:r>
-              <a:rPr lang="en-US" dirty="0" smtClean="0"/>
-              <a:t>xamples of cloud computing</a:t>
+              <a:t>Examples of cloud computing</a:t>
+            </a:r>
+          </a:p>
+        </p:txBody>
+      </p:sp>
+      <p:sp>
+        <p:nvSpPr>
+          <p:cNvPr id="3" name="Content Placeholder 2"/>
+          <p:cNvSpPr>
+            <a:spLocks noGrp="1"/>
+          </p:cNvSpPr>
+          <p:nvPr>
+            <p:ph idx="1"/>
+          </p:nvPr>
+        </p:nvSpPr>
+        <p:spPr/>
+        <p:txBody>
+          <a:bodyPr/>
+          <a:lstStyle/>
+          <a:p>
+            <a:r>
+              <a:rPr lang="en-US" dirty="0"/>
+              <a:t>Consumer services like Gmail or the cloud backup of the photos on your smartphone , </a:t>
+            </a:r>
+            <a:r>
+              <a:rPr lang="en-US" dirty="0" err="1"/>
+              <a:t>OneDrive</a:t>
+            </a:r>
+            <a:r>
+              <a:rPr lang="en-US" dirty="0"/>
+              <a:t> </a:t>
+            </a:r>
+            <a:r>
+              <a:rPr lang="en-US" dirty="0" err="1"/>
+              <a:t>etc</a:t>
             </a:r>
             <a:endParaRPr lang="en-US" dirty="0"/>
           </a:p>
-        </p:txBody>
-      </p:sp>
-      <p:sp>
-        <p:nvSpPr>
-          <p:cNvPr id="3" name="Content Placeholder 2"/>
-          <p:cNvSpPr>
-            <a:spLocks noGrp="1"/>
-          </p:cNvSpPr>
-          <p:nvPr>
-            <p:ph idx="1"/>
-          </p:nvPr>
-        </p:nvSpPr>
-        <p:spPr/>
-        <p:txBody>
-          <a:bodyPr/>
-          <a:lstStyle/>
-          <a:p>
-            <a:r>
-              <a:rPr lang="en-US" dirty="0" smtClean="0"/>
-              <a:t>Consumer </a:t>
-            </a:r>
-            <a:r>
-              <a:rPr lang="en-US" dirty="0"/>
-              <a:t>services like Gmail or the cloud backup of the photos on your </a:t>
-            </a:r>
-            <a:r>
-              <a:rPr lang="en-US" dirty="0" smtClean="0"/>
-              <a:t>smartphone , </a:t>
-            </a:r>
-            <a:r>
-              <a:rPr lang="en-US" dirty="0" err="1" smtClean="0"/>
-              <a:t>OneDrive</a:t>
-            </a:r>
-            <a:r>
-              <a:rPr lang="en-US" dirty="0" smtClean="0"/>
-              <a:t> </a:t>
-            </a:r>
-            <a:r>
-              <a:rPr lang="en-US" dirty="0" err="1" smtClean="0"/>
-              <a:t>etc</a:t>
-            </a:r>
-            <a:endParaRPr lang="en-US" dirty="0" smtClean="0"/>
-          </a:p>
-          <a:p>
-            <a:r>
-              <a:rPr lang="en-US" dirty="0" smtClean="0"/>
-              <a:t>Some large enterprises </a:t>
-            </a:r>
-            <a:r>
-              <a:rPr lang="en-US" dirty="0"/>
-              <a:t>host all their data and run all of their applications in the cloud</a:t>
-            </a:r>
-            <a:r>
-              <a:rPr lang="en-US" dirty="0" smtClean="0"/>
-              <a:t>.</a:t>
+          <a:p>
+            <a:r>
+              <a:rPr lang="en-US" dirty="0"/>
+              <a:t>Some large enterprises host all their data and run all of their applications in the cloud.</a:t>
             </a:r>
           </a:p>
           <a:p>
@@ -5321,18 +5176,13 @@
               <a:buNone/>
             </a:pPr>
             <a:r>
-              <a:rPr lang="en-US" i="1" dirty="0" smtClean="0">
+              <a:rPr lang="en-US" i="1" dirty="0">
                 <a:solidFill>
                   <a:srgbClr val="FF0000"/>
                 </a:solidFill>
               </a:rPr>
               <a:t>For example, Netflix relies on cloud-computing services to run its video-streaming service and its other business systems, too.</a:t>
             </a:r>
-            <a:endParaRPr lang="en-US" i="1" dirty="0">
-              <a:solidFill>
-                <a:srgbClr val="FF0000"/>
-              </a:solidFill>
-            </a:endParaRPr>
           </a:p>
         </p:txBody>
       </p:sp>
@@ -5346,6 +5196,183 @@
   <p:clrMapOvr>
     <a:masterClrMapping/>
   </p:clrMapOvr>
+  <p:timing>
+    <p:tnLst>
+      <p:par>
+        <p:cTn id="1" dur="indefinite" restart="never" nodeType="tmRoot">
+          <p:childTnLst>
+            <p:seq concurrent="1" nextAc="seek">
+              <p:cTn id="2" dur="indefinite" nodeType="mainSeq">
+                <p:childTnLst>
+                  <p:par>
+                    <p:cTn id="3" fill="hold">
+                      <p:stCondLst>
+                        <p:cond delay="indefinite"/>
+                      </p:stCondLst>
+                      <p:childTnLst>
+                        <p:par>
+                          <p:cTn id="4" fill="hold">
+                            <p:stCondLst>
+                              <p:cond delay="0"/>
+                            </p:stCondLst>
+                            <p:childTnLst>
+                              <p:par>
+                                <p:cTn id="5" presetID="14" presetClass="entr" presetSubtype="10" fill="hold" nodeType="clickEffect">
+                                  <p:stCondLst>
+                                    <p:cond delay="0"/>
+                                  </p:stCondLst>
+                                  <p:childTnLst>
+                                    <p:set>
+                                      <p:cBhvr>
+                                        <p:cTn id="6" dur="1" fill="hold">
+                                          <p:stCondLst>
+                                            <p:cond delay="0"/>
+                                          </p:stCondLst>
+                                        </p:cTn>
+                                        <p:tgtEl>
+                                          <p:spTgt spid="3">
+                                            <p:txEl>
+                                              <p:pRg st="0" end="0"/>
+                                            </p:txEl>
+                                          </p:spTgt>
+                                        </p:tgtEl>
+                                        <p:attrNameLst>
+                                          <p:attrName>style.visibility</p:attrName>
+                                        </p:attrNameLst>
+                                      </p:cBhvr>
+                                      <p:to>
+                                        <p:strVal val="visible"/>
+                                      </p:to>
+                                    </p:set>
+                                    <p:animEffect transition="in" filter="randombar(horizontal)">
+                                      <p:cBhvr>
+                                        <p:cTn id="7" dur="500"/>
+                                        <p:tgtEl>
+                                          <p:spTgt spid="3">
+                                            <p:txEl>
+                                              <p:pRg st="0" end="0"/>
+                                            </p:txEl>
+                                          </p:spTgt>
+                                        </p:tgtEl>
+                                      </p:cBhvr>
+                                    </p:animEffect>
+                                  </p:childTnLst>
+                                </p:cTn>
+                              </p:par>
+                              <p:par>
+                                <p:cTn id="8" presetID="14" presetClass="entr" presetSubtype="10" fill="hold" nodeType="withEffect">
+                                  <p:stCondLst>
+                                    <p:cond delay="0"/>
+                                  </p:stCondLst>
+                                  <p:childTnLst>
+                                    <p:set>
+                                      <p:cBhvr>
+                                        <p:cTn id="9" dur="1" fill="hold">
+                                          <p:stCondLst>
+                                            <p:cond delay="0"/>
+                                          </p:stCondLst>
+                                        </p:cTn>
+                                        <p:tgtEl>
+                                          <p:spTgt spid="3">
+                                            <p:txEl>
+                                              <p:pRg st="1" end="1"/>
+                                            </p:txEl>
+                                          </p:spTgt>
+                                        </p:tgtEl>
+                                        <p:attrNameLst>
+                                          <p:attrName>style.visibility</p:attrName>
+                                        </p:attrNameLst>
+                                      </p:cBhvr>
+                                      <p:to>
+                                        <p:strVal val="visible"/>
+                                      </p:to>
+                                    </p:set>
+                                    <p:animEffect transition="in" filter="randombar(horizontal)">
+                                      <p:cBhvr>
+                                        <p:cTn id="10" dur="500"/>
+                                        <p:tgtEl>
+                                          <p:spTgt spid="3">
+                                            <p:txEl>
+                                              <p:pRg st="1" end="1"/>
+                                            </p:txEl>
+                                          </p:spTgt>
+                                        </p:tgtEl>
+                                      </p:cBhvr>
+                                    </p:animEffect>
+                                  </p:childTnLst>
+                                </p:cTn>
+                              </p:par>
+                              <p:par>
+                                <p:cTn id="11" presetID="14" presetClass="entr" presetSubtype="10" fill="hold" nodeType="withEffect">
+                                  <p:stCondLst>
+                                    <p:cond delay="0"/>
+                                  </p:stCondLst>
+                                  <p:childTnLst>
+                                    <p:set>
+                                      <p:cBhvr>
+                                        <p:cTn id="12" dur="1" fill="hold">
+                                          <p:stCondLst>
+                                            <p:cond delay="0"/>
+                                          </p:stCondLst>
+                                        </p:cTn>
+                                        <p:tgtEl>
+                                          <p:spTgt spid="3">
+                                            <p:txEl>
+                                              <p:pRg st="2" end="2"/>
+                                            </p:txEl>
+                                          </p:spTgt>
+                                        </p:tgtEl>
+                                        <p:attrNameLst>
+                                          <p:attrName>style.visibility</p:attrName>
+                                        </p:attrNameLst>
+                                      </p:cBhvr>
+                                      <p:to>
+                                        <p:strVal val="visible"/>
+                                      </p:to>
+                                    </p:set>
+                                    <p:animEffect transition="in" filter="randombar(horizontal)">
+                                      <p:cBhvr>
+                                        <p:cTn id="13" dur="500"/>
+                                        <p:tgtEl>
+                                          <p:spTgt spid="3">
+                                            <p:txEl>
+                                              <p:pRg st="2" end="2"/>
+                                            </p:txEl>
+                                          </p:spTgt>
+                                        </p:tgtEl>
+                                      </p:cBhvr>
+                                    </p:animEffect>
+                                  </p:childTnLst>
+                                </p:cTn>
+                              </p:par>
+                            </p:childTnLst>
+                          </p:cTn>
+                        </p:par>
+                      </p:childTnLst>
+                    </p:cTn>
+                  </p:par>
+                </p:childTnLst>
+              </p:cTn>
+              <p:prevCondLst>
+                <p:cond evt="onPrev" delay="0">
+                  <p:tgtEl>
+                    <p:sldTgt/>
+                  </p:tgtEl>
+                </p:cond>
+              </p:prevCondLst>
+              <p:nextCondLst>
+                <p:cond evt="onNext" delay="0">
+                  <p:tgtEl>
+                    <p:sldTgt/>
+                  </p:tgtEl>
+                </p:cond>
+              </p:nextCondLst>
+            </p:seq>
+          </p:childTnLst>
+        </p:cTn>
+      </p:par>
+    </p:tnLst>
+  </p:timing>
 </p:sld>
 </file>
 
@@ -5389,82 +5416,38 @@
           <a:lstStyle/>
           <a:p>
             <a:r>
-              <a:rPr lang="en-US" dirty="0" smtClean="0"/>
-              <a:t>Cloud </a:t>
-            </a:r>
-            <a:r>
-              <a:rPr lang="en-US" dirty="0"/>
-              <a:t>computing is not just for organizations and </a:t>
-            </a:r>
-            <a:r>
-              <a:rPr lang="en-US" dirty="0" smtClean="0"/>
-              <a:t>businesses</a:t>
-            </a:r>
-          </a:p>
-          <a:p>
-            <a:r>
-              <a:rPr lang="en-US" dirty="0" smtClean="0"/>
-              <a:t>it’s </a:t>
-            </a:r>
-            <a:r>
-              <a:rPr lang="en-US" dirty="0"/>
-              <a:t>also useful for the average person as </a:t>
-            </a:r>
-            <a:r>
-              <a:rPr lang="en-US" dirty="0" smtClean="0"/>
-              <a:t>well</a:t>
-            </a:r>
-          </a:p>
-          <a:p>
-            <a:r>
-              <a:rPr lang="en-US" dirty="0" smtClean="0"/>
-              <a:t>It </a:t>
-            </a:r>
-            <a:r>
-              <a:rPr lang="en-US" dirty="0"/>
-              <a:t>enables us to run software programs without installing them on our </a:t>
-            </a:r>
-            <a:r>
-              <a:rPr lang="en-US" dirty="0" smtClean="0"/>
-              <a:t>computers</a:t>
-            </a:r>
-          </a:p>
-          <a:p>
-            <a:r>
-              <a:rPr lang="en-US" dirty="0" smtClean="0"/>
-              <a:t>it </a:t>
-            </a:r>
-            <a:r>
-              <a:rPr lang="en-US" dirty="0"/>
-              <a:t>enables us to store and access our multimedia content via the </a:t>
-            </a:r>
-            <a:r>
-              <a:rPr lang="en-US" dirty="0" smtClean="0"/>
-              <a:t>internet</a:t>
-            </a:r>
-          </a:p>
-          <a:p>
-            <a:r>
-              <a:rPr lang="en-US" dirty="0" smtClean="0"/>
-              <a:t>it </a:t>
-            </a:r>
-            <a:r>
-              <a:rPr lang="en-US" dirty="0"/>
-              <a:t>enables us to develop and test programs without necessarily having servers and so </a:t>
-            </a:r>
-            <a:r>
-              <a:rPr lang="en-US" dirty="0" smtClean="0"/>
-              <a:t>on</a:t>
-            </a:r>
-          </a:p>
-          <a:p>
-            <a:r>
-              <a:rPr lang="en-US" dirty="0" smtClean="0"/>
-              <a:t>Cloud </a:t>
-            </a:r>
-            <a:r>
-              <a:rPr lang="en-US" dirty="0"/>
-              <a:t>computing is a 21st-century marvel that holds its importance in almost every field you can think of.</a:t>
+              <a:rPr lang="en-US" dirty="0"/>
+              <a:t>Cloud computing is not just for organizations and businesses</a:t>
+            </a:r>
+          </a:p>
+          <a:p>
+            <a:r>
+              <a:rPr lang="en-US" dirty="0"/>
+              <a:t>it’s also useful for the average person as well</a:t>
+            </a:r>
+          </a:p>
+          <a:p>
+            <a:r>
+              <a:rPr lang="en-US" dirty="0"/>
+              <a:t>It enables us to run software programs without installing them on our computers</a:t>
+            </a:r>
+          </a:p>
+          <a:p>
+            <a:r>
+              <a:rPr lang="en-US" dirty="0"/>
+              <a:t>it enables us to store and access our multimedia content via the internet</a:t>
+            </a:r>
+          </a:p>
+          <a:p>
+            <a:r>
+              <a:rPr lang="en-US" dirty="0"/>
+              <a:t>it enables us to develop and test programs without necessarily having servers and so on</a:t>
+            </a:r>
+          </a:p>
+          <a:p>
+            <a:r>
+              <a:rPr lang="en-US" dirty="0"/>
+              <a:t>Cloud computing is a 21st-century marvel that holds its importance in almost every field you can think of.</a:t>
             </a:r>
           </a:p>
         </p:txBody>

</xml_diff>